<commit_message>
Add more diagrams to developer guide
</commit_message>
<xml_diff>
--- a/docs/diagrams/FilterOperationSequenceDiagram.pptx
+++ b/docs/diagrams/FilterOperationSequenceDiagram.pptx
@@ -5,10 +5,11 @@
     <p:sldMasterId id="2147483648" r:id="rId1"/>
   </p:sldMasterIdLst>
   <p:notesMasterIdLst>
-    <p:notesMasterId r:id="rId3"/>
+    <p:notesMasterId r:id="rId4"/>
   </p:notesMasterIdLst>
   <p:sldIdLst>
-    <p:sldId id="267" r:id="rId2"/>
+    <p:sldId id="269" r:id="rId2"/>
+    <p:sldId id="268" r:id="rId3"/>
   </p:sldIdLst>
   <p:sldSz cx="9144000" cy="6858000" type="screen4x3"/>
   <p:notesSz cx="6858000" cy="9144000"/>
@@ -212,7 +213,7 @@
           <a:p>
             <a:fld id="{F5CC4B3F-88C1-4FFA-B1B6-F41C21DC6924}" type="datetimeFigureOut">
               <a:rPr lang="en-US" smtClean="0"/>
-              <a:t>10/16/2018</a:t>
+              <a:t>11/6/2018</a:t>
             </a:fld>
             <a:endParaRPr lang="en-US"/>
           </a:p>
@@ -658,7 +659,7 @@
           <a:p>
             <a:fld id="{78C97017-6FC3-485B-9764-EAC9E56C1D49}" type="datetimeFigureOut">
               <a:rPr lang="en-US" smtClean="0"/>
-              <a:t>10/16/2018</a:t>
+              <a:t>11/6/2018</a:t>
             </a:fld>
             <a:endParaRPr lang="en-US"/>
           </a:p>
@@ -826,7 +827,7 @@
           <a:p>
             <a:fld id="{78C97017-6FC3-485B-9764-EAC9E56C1D49}" type="datetimeFigureOut">
               <a:rPr lang="en-US" smtClean="0"/>
-              <a:t>10/16/2018</a:t>
+              <a:t>11/6/2018</a:t>
             </a:fld>
             <a:endParaRPr lang="en-US"/>
           </a:p>
@@ -1004,7 +1005,7 @@
           <a:p>
             <a:fld id="{78C97017-6FC3-485B-9764-EAC9E56C1D49}" type="datetimeFigureOut">
               <a:rPr lang="en-US" smtClean="0"/>
-              <a:t>10/16/2018</a:t>
+              <a:t>11/6/2018</a:t>
             </a:fld>
             <a:endParaRPr lang="en-US"/>
           </a:p>
@@ -1172,7 +1173,7 @@
           <a:p>
             <a:fld id="{78C97017-6FC3-485B-9764-EAC9E56C1D49}" type="datetimeFigureOut">
               <a:rPr lang="en-US" smtClean="0"/>
-              <a:t>10/16/2018</a:t>
+              <a:t>11/6/2018</a:t>
             </a:fld>
             <a:endParaRPr lang="en-US"/>
           </a:p>
@@ -1417,7 +1418,7 @@
           <a:p>
             <a:fld id="{78C97017-6FC3-485B-9764-EAC9E56C1D49}" type="datetimeFigureOut">
               <a:rPr lang="en-US" smtClean="0"/>
-              <a:t>10/16/2018</a:t>
+              <a:t>11/6/2018</a:t>
             </a:fld>
             <a:endParaRPr lang="en-US"/>
           </a:p>
@@ -1702,7 +1703,7 @@
           <a:p>
             <a:fld id="{78C97017-6FC3-485B-9764-EAC9E56C1D49}" type="datetimeFigureOut">
               <a:rPr lang="en-US" smtClean="0"/>
-              <a:t>10/16/2018</a:t>
+              <a:t>11/6/2018</a:t>
             </a:fld>
             <a:endParaRPr lang="en-US"/>
           </a:p>
@@ -2121,7 +2122,7 @@
           <a:p>
             <a:fld id="{78C97017-6FC3-485B-9764-EAC9E56C1D49}" type="datetimeFigureOut">
               <a:rPr lang="en-US" smtClean="0"/>
-              <a:t>10/16/2018</a:t>
+              <a:t>11/6/2018</a:t>
             </a:fld>
             <a:endParaRPr lang="en-US"/>
           </a:p>
@@ -2238,7 +2239,7 @@
           <a:p>
             <a:fld id="{78C97017-6FC3-485B-9764-EAC9E56C1D49}" type="datetimeFigureOut">
               <a:rPr lang="en-US" smtClean="0"/>
-              <a:t>10/16/2018</a:t>
+              <a:t>11/6/2018</a:t>
             </a:fld>
             <a:endParaRPr lang="en-US"/>
           </a:p>
@@ -2333,7 +2334,7 @@
           <a:p>
             <a:fld id="{78C97017-6FC3-485B-9764-EAC9E56C1D49}" type="datetimeFigureOut">
               <a:rPr lang="en-US" smtClean="0"/>
-              <a:t>10/16/2018</a:t>
+              <a:t>11/6/2018</a:t>
             </a:fld>
             <a:endParaRPr lang="en-US"/>
           </a:p>
@@ -2608,7 +2609,7 @@
           <a:p>
             <a:fld id="{78C97017-6FC3-485B-9764-EAC9E56C1D49}" type="datetimeFigureOut">
               <a:rPr lang="en-US" smtClean="0"/>
-              <a:t>10/16/2018</a:t>
+              <a:t>11/6/2018</a:t>
             </a:fld>
             <a:endParaRPr lang="en-US"/>
           </a:p>
@@ -2860,7 +2861,7 @@
           <a:p>
             <a:fld id="{78C97017-6FC3-485B-9764-EAC9E56C1D49}" type="datetimeFigureOut">
               <a:rPr lang="en-US" smtClean="0"/>
-              <a:t>10/16/2018</a:t>
+              <a:t>11/6/2018</a:t>
             </a:fld>
             <a:endParaRPr lang="en-US"/>
           </a:p>
@@ -3071,7 +3072,7 @@
           <a:p>
             <a:fld id="{78C97017-6FC3-485B-9764-EAC9E56C1D49}" type="datetimeFigureOut">
               <a:rPr lang="en-US" smtClean="0"/>
-              <a:t>10/16/2018</a:t>
+              <a:t>11/6/2018</a:t>
             </a:fld>
             <a:endParaRPr lang="en-US"/>
           </a:p>
@@ -3576,8 +3577,8 @@
         </p:nvSpPr>
         <p:spPr>
           <a:xfrm>
-            <a:off x="750523" y="2648316"/>
-            <a:ext cx="7783877" cy="2076084"/>
+            <a:off x="483859" y="2648316"/>
+            <a:ext cx="8050541" cy="2076084"/>
           </a:xfrm>
           <a:prstGeom prst="rect">
             <a:avLst/>
@@ -3692,7 +3693,7 @@
         <p:spPr>
           <a:xfrm>
             <a:off x="1610959" y="907617"/>
-            <a:ext cx="0" cy="3481399"/>
+            <a:ext cx="0" cy="4668453"/>
           </a:xfrm>
           <a:prstGeom prst="line">
             <a:avLst/>
@@ -3767,78 +3768,20 @@
           </a:p>
         </p:txBody>
       </p:sp>
-      <p:sp>
-        <p:nvSpPr>
-          <p:cNvPr id="16" name="Rectangle 62"/>
-          <p:cNvSpPr/>
-          <p:nvPr/>
-        </p:nvSpPr>
-        <p:spPr>
-          <a:xfrm>
-            <a:off x="2781264" y="1198920"/>
-            <a:ext cx="2933736" cy="336834"/>
-          </a:xfrm>
-          <a:prstGeom prst="rect">
-            <a:avLst/>
-          </a:prstGeom>
-          <a:solidFill>
-            <a:srgbClr val="0070C0"/>
-          </a:solidFill>
-          <a:ln w="19050">
-            <a:solidFill>
-              <a:srgbClr val="0070C0"/>
-            </a:solidFill>
-          </a:ln>
-          <a:effectLst/>
-        </p:spPr>
-        <p:style>
-          <a:lnRef idx="1">
-            <a:schemeClr val="accent2"/>
-          </a:lnRef>
-          <a:fillRef idx="2">
-            <a:schemeClr val="accent2"/>
-          </a:fillRef>
-          <a:effectRef idx="1">
-            <a:schemeClr val="accent2"/>
-          </a:effectRef>
-          <a:fontRef idx="minor">
-            <a:schemeClr val="dk1"/>
-          </a:fontRef>
-        </p:style>
-        <p:txBody>
-          <a:bodyPr rtlCol="0" anchor="ctr"/>
-          <a:lstStyle/>
-          <a:p>
-            <a:pPr algn="ctr"/>
-            <a:r>
-              <a:rPr lang="en-US" sz="1500" dirty="0" smtClean="0">
-                <a:solidFill>
-                  <a:schemeClr val="bg1"/>
-                </a:solidFill>
-              </a:rPr>
-              <a:t>e:BooleanExpressionParser&lt;Task&gt;</a:t>
-            </a:r>
-            <a:endParaRPr lang="en-SG" sz="1500" dirty="0">
-              <a:solidFill>
-                <a:schemeClr val="bg1"/>
-              </a:solidFill>
-            </a:endParaRPr>
-          </a:p>
-        </p:txBody>
-      </p:sp>
       <p:cxnSp>
         <p:nvCxnSpPr>
           <p:cNvPr id="17" name="Straight Connector 16"/>
           <p:cNvCxnSpPr>
             <a:cxnSpLocks/>
+            <a:stCxn id="41" idx="0"/>
             <a:endCxn id="4" idx="0"/>
           </p:cNvCxnSpPr>
           <p:nvPr/>
         </p:nvCxnSpPr>
         <p:spPr>
           <a:xfrm flipH="1">
-            <a:off x="4113568" y="1576770"/>
-            <a:ext cx="10095" cy="3737690"/>
+            <a:off x="4113568" y="1733916"/>
+            <a:ext cx="3090" cy="3580544"/>
           </a:xfrm>
           <a:prstGeom prst="line">
             <a:avLst/>
@@ -3866,57 +3809,6 @@
           </a:fontRef>
         </p:style>
       </p:cxnSp>
-      <p:sp>
-        <p:nvSpPr>
-          <p:cNvPr id="18" name="Rectangle 17"/>
-          <p:cNvSpPr/>
-          <p:nvPr/>
-        </p:nvSpPr>
-        <p:spPr>
-          <a:xfrm>
-            <a:off x="4051656" y="1529965"/>
-            <a:ext cx="154408" cy="375036"/>
-          </a:xfrm>
-          <a:prstGeom prst="rect">
-            <a:avLst/>
-          </a:prstGeom>
-          <a:solidFill>
-            <a:srgbClr val="0070C0"/>
-          </a:solidFill>
-          <a:ln>
-            <a:solidFill>
-              <a:srgbClr val="0070C0"/>
-            </a:solidFill>
-          </a:ln>
-          <a:effectLst/>
-        </p:spPr>
-        <p:style>
-          <a:lnRef idx="1">
-            <a:schemeClr val="accent3"/>
-          </a:lnRef>
-          <a:fillRef idx="2">
-            <a:schemeClr val="accent3"/>
-          </a:fillRef>
-          <a:effectRef idx="1">
-            <a:schemeClr val="accent3"/>
-          </a:effectRef>
-          <a:fontRef idx="minor">
-            <a:schemeClr val="dk1"/>
-          </a:fontRef>
-        </p:style>
-        <p:txBody>
-          <a:bodyPr rtlCol="0" anchor="ctr"/>
-          <a:lstStyle/>
-          <a:p>
-            <a:pPr algn="ctr"/>
-            <a:endParaRPr lang="en-SG" sz="1400">
-              <a:solidFill>
-                <a:schemeClr val="dk1"/>
-              </a:solidFill>
-            </a:endParaRPr>
-          </a:p>
-        </p:txBody>
-      </p:sp>
       <p:cxnSp>
         <p:nvCxnSpPr>
           <p:cNvPr id="23" name="Straight Arrow Connector 22"/>
@@ -4043,7 +3935,7 @@
         </p:nvCxnSpPr>
         <p:spPr>
           <a:xfrm>
-            <a:off x="1691351" y="1905000"/>
+            <a:off x="1691351" y="1992694"/>
             <a:ext cx="2348067" cy="0"/>
           </a:xfrm>
           <a:prstGeom prst="straightConnector1">
@@ -4203,14 +4095,412 @@
       </p:sp>
       <p:sp>
         <p:nvSpPr>
-          <p:cNvPr id="93" name="TextBox 92"/>
+          <p:cNvPr id="40" name="Rectangle 62"/>
+          <p:cNvSpPr/>
+          <p:nvPr/>
+        </p:nvSpPr>
+        <p:spPr>
+          <a:xfrm>
+            <a:off x="7353844" y="1999117"/>
+            <a:ext cx="925158" cy="300180"/>
+          </a:xfrm>
+          <a:prstGeom prst="rect">
+            <a:avLst/>
+          </a:prstGeom>
+          <a:solidFill>
+            <a:srgbClr val="7030A0"/>
+          </a:solidFill>
+          <a:ln w="19050">
+            <a:solidFill>
+              <a:srgbClr val="7030A0"/>
+            </a:solidFill>
+          </a:ln>
+          <a:effectLst/>
+        </p:spPr>
+        <p:style>
+          <a:lnRef idx="1">
+            <a:schemeClr val="accent2"/>
+          </a:lnRef>
+          <a:fillRef idx="2">
+            <a:schemeClr val="accent2"/>
+          </a:fillRef>
+          <a:effectRef idx="1">
+            <a:schemeClr val="accent2"/>
+          </a:effectRef>
+          <a:fontRef idx="minor">
+            <a:schemeClr val="dk1"/>
+          </a:fontRef>
+        </p:style>
+        <p:txBody>
+          <a:bodyPr rtlCol="0" anchor="ctr"/>
+          <a:lstStyle/>
+          <a:p>
+            <a:pPr algn="ctr"/>
+            <a:r>
+              <a:rPr lang="en-US" sz="1600" dirty="0" smtClean="0">
+                <a:solidFill>
+                  <a:schemeClr val="bg1"/>
+                </a:solidFill>
+              </a:rPr>
+              <a:t>Field</a:t>
+            </a:r>
+            <a:endParaRPr lang="en-SG" sz="1600" dirty="0">
+              <a:solidFill>
+                <a:schemeClr val="bg1"/>
+              </a:solidFill>
+            </a:endParaRPr>
+          </a:p>
+        </p:txBody>
+      </p:sp>
+      <p:cxnSp>
+        <p:nvCxnSpPr>
+          <p:cNvPr id="46" name="Straight Connector 45"/>
+          <p:cNvCxnSpPr>
+            <a:cxnSpLocks/>
+            <a:stCxn id="40" idx="2"/>
+          </p:cNvCxnSpPr>
+          <p:nvPr/>
+        </p:nvCxnSpPr>
+        <p:spPr>
+          <a:xfrm>
+            <a:off x="7816423" y="2299297"/>
+            <a:ext cx="0" cy="2895104"/>
+          </a:xfrm>
+          <a:prstGeom prst="line">
+            <a:avLst/>
+          </a:prstGeom>
+          <a:ln w="19050">
+            <a:solidFill>
+              <a:srgbClr val="7030A0"/>
+            </a:solidFill>
+            <a:prstDash val="sysDash"/>
+          </a:ln>
+          <a:effectLst/>
+        </p:spPr>
+        <p:style>
+          <a:lnRef idx="1">
+            <a:schemeClr val="accent1"/>
+          </a:lnRef>
+          <a:fillRef idx="2">
+            <a:schemeClr val="accent1"/>
+          </a:fillRef>
+          <a:effectRef idx="1">
+            <a:schemeClr val="accent1"/>
+          </a:effectRef>
+          <a:fontRef idx="minor">
+            <a:schemeClr val="dk1"/>
+          </a:fontRef>
+        </p:style>
+      </p:cxnSp>
+      <p:sp>
+        <p:nvSpPr>
+          <p:cNvPr id="49" name="Rectangle 48"/>
+          <p:cNvSpPr/>
+          <p:nvPr/>
+        </p:nvSpPr>
+        <p:spPr>
+          <a:xfrm>
+            <a:off x="7713500" y="3522091"/>
+            <a:ext cx="168896" cy="528572"/>
+          </a:xfrm>
+          <a:prstGeom prst="rect">
+            <a:avLst/>
+          </a:prstGeom>
+          <a:solidFill>
+            <a:srgbClr val="7030A0"/>
+          </a:solidFill>
+          <a:ln>
+            <a:solidFill>
+              <a:srgbClr val="7030A0"/>
+            </a:solidFill>
+          </a:ln>
+          <a:effectLst/>
+        </p:spPr>
+        <p:style>
+          <a:lnRef idx="1">
+            <a:schemeClr val="accent3"/>
+          </a:lnRef>
+          <a:fillRef idx="2">
+            <a:schemeClr val="accent3"/>
+          </a:fillRef>
+          <a:effectRef idx="1">
+            <a:schemeClr val="accent3"/>
+          </a:effectRef>
+          <a:fontRef idx="minor">
+            <a:schemeClr val="dk1"/>
+          </a:fontRef>
+        </p:style>
+        <p:txBody>
+          <a:bodyPr rtlCol="0" anchor="ctr"/>
+          <a:lstStyle/>
+          <a:p>
+            <a:pPr algn="ctr"/>
+            <a:endParaRPr lang="en-SG" sz="1400"/>
+          </a:p>
+        </p:txBody>
+      </p:sp>
+      <p:cxnSp>
+        <p:nvCxnSpPr>
+          <p:cNvPr id="50" name="Straight Arrow Connector 49"/>
+          <p:cNvCxnSpPr>
+            <a:cxnSpLocks/>
+          </p:cNvCxnSpPr>
+          <p:nvPr/>
+        </p:nvCxnSpPr>
+        <p:spPr>
+          <a:xfrm>
+            <a:off x="1769559" y="3533835"/>
+            <a:ext cx="5943941" cy="0"/>
+          </a:xfrm>
+          <a:prstGeom prst="straightConnector1">
+            <a:avLst/>
+          </a:prstGeom>
+          <a:ln w="19050">
+            <a:solidFill>
+              <a:srgbClr val="0070C0"/>
+            </a:solidFill>
+            <a:tailEnd type="arrow"/>
+          </a:ln>
+        </p:spPr>
+        <p:style>
+          <a:lnRef idx="1">
+            <a:schemeClr val="accent1"/>
+          </a:lnRef>
+          <a:fillRef idx="0">
+            <a:schemeClr val="accent1"/>
+          </a:fillRef>
+          <a:effectRef idx="0">
+            <a:schemeClr val="accent1"/>
+          </a:effectRef>
+          <a:fontRef idx="minor">
+            <a:schemeClr val="tx1"/>
+          </a:fontRef>
+        </p:style>
+      </p:cxnSp>
+      <p:sp>
+        <p:nvSpPr>
+          <p:cNvPr id="4" name="TextBox 3"/>
           <p:cNvSpPr txBox="1"/>
           <p:nvPr/>
         </p:nvSpPr>
         <p:spPr>
           <a:xfrm>
-            <a:off x="2724792" y="1677193"/>
-            <a:ext cx="220343" cy="215444"/>
+            <a:off x="3982763" y="5314460"/>
+            <a:ext cx="261610" cy="261610"/>
+          </a:xfrm>
+          <a:prstGeom prst="rect">
+            <a:avLst/>
+          </a:prstGeom>
+          <a:noFill/>
+        </p:spPr>
+        <p:txBody>
+          <a:bodyPr wrap="none" rtlCol="0">
+            <a:spAutoFit/>
+          </a:bodyPr>
+          <a:lstStyle/>
+          <a:p>
+            <a:r>
+              <a:rPr lang="en-SG" sz="1100" b="1" dirty="0">
+                <a:solidFill>
+                  <a:srgbClr val="0070C0"/>
+                </a:solidFill>
+              </a:rPr>
+              <a:t>X</a:t>
+            </a:r>
+          </a:p>
+        </p:txBody>
+      </p:sp>
+      <p:cxnSp>
+        <p:nvCxnSpPr>
+          <p:cNvPr id="66" name="Straight Arrow Connector 65">
+            <a:extLst>
+              <a:ext uri="{FF2B5EF4-FFF2-40B4-BE49-F238E27FC236}">
+                <a16:creationId xmlns:a16="http://schemas.microsoft.com/office/drawing/2014/main" id="{39916E2E-195A-4DC8-B025-B05FA87E6796}"/>
+              </a:ext>
+            </a:extLst>
+          </p:cNvPr>
+          <p:cNvCxnSpPr>
+            <a:cxnSpLocks/>
+          </p:cNvCxnSpPr>
+          <p:nvPr/>
+        </p:nvCxnSpPr>
+        <p:spPr>
+          <a:xfrm>
+            <a:off x="1691351" y="2355703"/>
+            <a:ext cx="2348067" cy="0"/>
+          </a:xfrm>
+          <a:prstGeom prst="straightConnector1">
+            <a:avLst/>
+          </a:prstGeom>
+          <a:ln w="19050">
+            <a:solidFill>
+              <a:srgbClr val="0070C0"/>
+            </a:solidFill>
+            <a:tailEnd type="arrow"/>
+          </a:ln>
+        </p:spPr>
+        <p:style>
+          <a:lnRef idx="1">
+            <a:schemeClr val="accent1"/>
+          </a:lnRef>
+          <a:fillRef idx="0">
+            <a:schemeClr val="accent1"/>
+          </a:fillRef>
+          <a:effectRef idx="0">
+            <a:schemeClr val="accent1"/>
+          </a:effectRef>
+          <a:fontRef idx="minor">
+            <a:schemeClr val="tx1"/>
+          </a:fontRef>
+        </p:style>
+      </p:cxnSp>
+      <p:cxnSp>
+        <p:nvCxnSpPr>
+          <p:cNvPr id="63" name="Straight Arrow Connector 62">
+            <a:extLst>
+              <a:ext uri="{FF2B5EF4-FFF2-40B4-BE49-F238E27FC236}">
+                <a16:creationId xmlns:a16="http://schemas.microsoft.com/office/drawing/2014/main" id="{7C9F21BC-13A9-471F-825A-2621FD36355F}"/>
+              </a:ext>
+            </a:extLst>
+          </p:cNvPr>
+          <p:cNvCxnSpPr>
+            <a:cxnSpLocks/>
+          </p:cNvCxnSpPr>
+          <p:nvPr/>
+        </p:nvCxnSpPr>
+        <p:spPr>
+          <a:xfrm>
+            <a:off x="1769559" y="4050662"/>
+            <a:ext cx="6028389" cy="0"/>
+          </a:xfrm>
+          <a:prstGeom prst="straightConnector1">
+            <a:avLst/>
+          </a:prstGeom>
+          <a:ln w="19050">
+            <a:solidFill>
+              <a:srgbClr val="7030A0"/>
+            </a:solidFill>
+            <a:prstDash val="sysDash"/>
+            <a:headEnd type="arrow" w="med" len="med"/>
+            <a:tailEnd type="none" w="med" len="med"/>
+          </a:ln>
+        </p:spPr>
+        <p:style>
+          <a:lnRef idx="1">
+            <a:schemeClr val="accent1"/>
+          </a:lnRef>
+          <a:fillRef idx="0">
+            <a:schemeClr val="accent1"/>
+          </a:fillRef>
+          <a:effectRef idx="0">
+            <a:schemeClr val="accent1"/>
+          </a:effectRef>
+          <a:fontRef idx="minor">
+            <a:schemeClr val="tx1"/>
+          </a:fontRef>
+        </p:style>
+      </p:cxnSp>
+      <p:sp>
+        <p:nvSpPr>
+          <p:cNvPr id="44" name="Rectangle 43"/>
+          <p:cNvSpPr/>
+          <p:nvPr/>
+        </p:nvSpPr>
+        <p:spPr>
+          <a:xfrm>
+            <a:off x="4039489" y="2326518"/>
+            <a:ext cx="154408" cy="2720981"/>
+          </a:xfrm>
+          <a:prstGeom prst="rect">
+            <a:avLst/>
+          </a:prstGeom>
+          <a:solidFill>
+            <a:srgbClr val="0070C0"/>
+          </a:solidFill>
+          <a:ln>
+            <a:solidFill>
+              <a:srgbClr val="0070C0"/>
+            </a:solidFill>
+          </a:ln>
+          <a:effectLst/>
+        </p:spPr>
+        <p:style>
+          <a:lnRef idx="1">
+            <a:schemeClr val="accent3"/>
+          </a:lnRef>
+          <a:fillRef idx="2">
+            <a:schemeClr val="accent3"/>
+          </a:fillRef>
+          <a:effectRef idx="1">
+            <a:schemeClr val="accent3"/>
+          </a:effectRef>
+          <a:fontRef idx="minor">
+            <a:schemeClr val="dk1"/>
+          </a:fontRef>
+        </p:style>
+        <p:txBody>
+          <a:bodyPr rtlCol="0" anchor="ctr"/>
+          <a:lstStyle/>
+          <a:p>
+            <a:pPr algn="ctr"/>
+            <a:endParaRPr lang="en-SG" sz="1400">
+              <a:solidFill>
+                <a:schemeClr val="dk1"/>
+              </a:solidFill>
+            </a:endParaRPr>
+          </a:p>
+        </p:txBody>
+      </p:sp>
+      <p:cxnSp>
+        <p:nvCxnSpPr>
+          <p:cNvPr id="51" name="Straight Arrow Connector 50"/>
+          <p:cNvCxnSpPr>
+            <a:cxnSpLocks/>
+          </p:cNvCxnSpPr>
+          <p:nvPr/>
+        </p:nvCxnSpPr>
+        <p:spPr>
+          <a:xfrm>
+            <a:off x="1769559" y="3220705"/>
+            <a:ext cx="2274923" cy="0"/>
+          </a:xfrm>
+          <a:prstGeom prst="straightConnector1">
+            <a:avLst/>
+          </a:prstGeom>
+          <a:ln w="19050">
+            <a:solidFill>
+              <a:srgbClr val="0070C0"/>
+            </a:solidFill>
+            <a:prstDash val="solid"/>
+            <a:headEnd type="arrow" w="med" len="med"/>
+            <a:tailEnd type="none" w="med" len="med"/>
+          </a:ln>
+        </p:spPr>
+        <p:style>
+          <a:lnRef idx="1">
+            <a:schemeClr val="accent1"/>
+          </a:lnRef>
+          <a:fillRef idx="0">
+            <a:schemeClr val="accent1"/>
+          </a:fillRef>
+          <a:effectRef idx="0">
+            <a:schemeClr val="accent1"/>
+          </a:effectRef>
+          <a:fontRef idx="minor">
+            <a:schemeClr val="tx1"/>
+          </a:fontRef>
+        </p:style>
+      </p:cxnSp>
+      <p:sp>
+        <p:nvSpPr>
+          <p:cNvPr id="53" name="TextBox 52"/>
+          <p:cNvSpPr txBox="1"/>
+          <p:nvPr/>
+        </p:nvSpPr>
+        <p:spPr>
+          <a:xfrm>
+            <a:off x="2013430" y="2992898"/>
+            <a:ext cx="1948970" cy="215444"/>
           </a:xfrm>
           <a:prstGeom prst="rect">
             <a:avLst/>
@@ -4236,7 +4526,7 @@
           <a:p>
             <a:r>
               <a:rPr lang="en-US" dirty="0" smtClean="0"/>
-              <a:t>e</a:t>
+              <a:t>&lt;lambda&gt;.parse(tokenizer)</a:t>
             </a:r>
             <a:endParaRPr lang="en-US" dirty="0"/>
           </a:p>
@@ -4244,24 +4534,430 @@
       </p:sp>
       <p:sp>
         <p:nvSpPr>
-          <p:cNvPr id="40" name="Rectangle 62"/>
+          <p:cNvPr id="54" name="Rectangle 53"/>
           <p:cNvSpPr/>
           <p:nvPr/>
         </p:nvSpPr>
         <p:spPr>
           <a:xfrm>
-            <a:off x="7353844" y="1999117"/>
-            <a:ext cx="925158" cy="300180"/>
+            <a:off x="1615151" y="3212093"/>
+            <a:ext cx="154408" cy="1183582"/>
           </a:xfrm>
           <a:prstGeom prst="rect">
             <a:avLst/>
           </a:prstGeom>
           <a:solidFill>
-            <a:srgbClr val="7030A0"/>
+            <a:srgbClr val="0070C0"/>
           </a:solidFill>
           <a:ln w="19050">
             <a:solidFill>
-              <a:srgbClr val="7030A0"/>
+              <a:schemeClr val="accent1">
+                <a:lumMod val="20000"/>
+                <a:lumOff val="80000"/>
+              </a:schemeClr>
+            </a:solidFill>
+          </a:ln>
+          <a:effectLst/>
+        </p:spPr>
+        <p:style>
+          <a:lnRef idx="1">
+            <a:schemeClr val="accent3"/>
+          </a:lnRef>
+          <a:fillRef idx="2">
+            <a:schemeClr val="accent3"/>
+          </a:fillRef>
+          <a:effectRef idx="1">
+            <a:schemeClr val="accent3"/>
+          </a:effectRef>
+          <a:fontRef idx="minor">
+            <a:schemeClr val="dk1"/>
+          </a:fontRef>
+        </p:style>
+        <p:txBody>
+          <a:bodyPr rtlCol="0" anchor="ctr"/>
+          <a:lstStyle/>
+          <a:p>
+            <a:pPr algn="ctr"/>
+            <a:endParaRPr lang="en-SG" sz="1400">
+              <a:solidFill>
+                <a:schemeClr val="dk1"/>
+              </a:solidFill>
+            </a:endParaRPr>
+          </a:p>
+        </p:txBody>
+      </p:sp>
+      <p:sp>
+        <p:nvSpPr>
+          <p:cNvPr id="57" name="TextBox 56"/>
+          <p:cNvSpPr txBox="1"/>
+          <p:nvPr/>
+        </p:nvSpPr>
+        <p:spPr>
+          <a:xfrm>
+            <a:off x="4577433" y="3056749"/>
+            <a:ext cx="1955216" cy="430887"/>
+          </a:xfrm>
+          <a:prstGeom prst="rect">
+            <a:avLst/>
+          </a:prstGeom>
+          <a:noFill/>
+        </p:spPr>
+        <p:txBody>
+          <a:bodyPr wrap="square" lIns="0" tIns="0" rIns="0" bIns="0" rtlCol="0">
+            <a:spAutoFit/>
+          </a:bodyPr>
+          <a:lstStyle>
+            <a:defPPr>
+              <a:defRPr lang="en-US"/>
+            </a:defPPr>
+            <a:lvl1pPr algn="r">
+              <a:defRPr sz="1400">
+                <a:solidFill>
+                  <a:srgbClr val="0070C0"/>
+                </a:solidFill>
+              </a:defRPr>
+            </a:lvl1pPr>
+          </a:lstStyle>
+          <a:p>
+            <a:pPr algn="ctr"/>
+            <a:r>
+              <a:rPr lang="en-US" dirty="0" smtClean="0"/>
+              <a:t>&lt;&lt;static&gt;&gt;</a:t>
+            </a:r>
+          </a:p>
+          <a:p>
+            <a:pPr algn="ctr"/>
+            <a:r>
+              <a:rPr lang="en-US" dirty="0" err="1" smtClean="0"/>
+              <a:t>makeFilter</a:t>
+            </a:r>
+            <a:r>
+              <a:rPr lang="en-US" dirty="0" smtClean="0"/>
+              <a:t>(op, </a:t>
+            </a:r>
+            <a:r>
+              <a:rPr lang="en-US" dirty="0" err="1" smtClean="0"/>
+              <a:t>testPhrase</a:t>
+            </a:r>
+            <a:r>
+              <a:rPr lang="en-US" dirty="0" smtClean="0"/>
+              <a:t>)</a:t>
+            </a:r>
+            <a:endParaRPr lang="en-US" dirty="0"/>
+          </a:p>
+        </p:txBody>
+      </p:sp>
+      <p:sp>
+        <p:nvSpPr>
+          <p:cNvPr id="61" name="TextBox 60"/>
+          <p:cNvSpPr txBox="1"/>
+          <p:nvPr/>
+        </p:nvSpPr>
+        <p:spPr>
+          <a:xfrm>
+            <a:off x="2514600" y="4177579"/>
+            <a:ext cx="855809" cy="215444"/>
+          </a:xfrm>
+          <a:prstGeom prst="rect">
+            <a:avLst/>
+          </a:prstGeom>
+          <a:noFill/>
+        </p:spPr>
+        <p:txBody>
+          <a:bodyPr wrap="square" lIns="0" tIns="0" rIns="0" bIns="0" rtlCol="0">
+            <a:spAutoFit/>
+          </a:bodyPr>
+          <a:lstStyle>
+            <a:defPPr>
+              <a:defRPr lang="en-US"/>
+            </a:defPPr>
+            <a:lvl1pPr algn="r">
+              <a:defRPr sz="1400">
+                <a:solidFill>
+                  <a:srgbClr val="0070C0"/>
+                </a:solidFill>
+              </a:defRPr>
+            </a:lvl1pPr>
+          </a:lstStyle>
+          <a:p>
+            <a:r>
+              <a:rPr lang="en-US" dirty="0" smtClean="0"/>
+              <a:t>predicate</a:t>
+            </a:r>
+            <a:endParaRPr lang="en-US" dirty="0"/>
+          </a:p>
+        </p:txBody>
+      </p:sp>
+      <p:cxnSp>
+        <p:nvCxnSpPr>
+          <p:cNvPr id="62" name="Straight Arrow Connector 61">
+            <a:extLst>
+              <a:ext uri="{FF2B5EF4-FFF2-40B4-BE49-F238E27FC236}">
+                <a16:creationId xmlns:a16="http://schemas.microsoft.com/office/drawing/2014/main" id="{39916E2E-195A-4DC8-B025-B05FA87E6796}"/>
+              </a:ext>
+            </a:extLst>
+          </p:cNvPr>
+          <p:cNvCxnSpPr>
+            <a:cxnSpLocks/>
+          </p:cNvCxnSpPr>
+          <p:nvPr/>
+        </p:nvCxnSpPr>
+        <p:spPr>
+          <a:xfrm>
+            <a:off x="1763898" y="4399682"/>
+            <a:ext cx="2275520" cy="0"/>
+          </a:xfrm>
+          <a:prstGeom prst="straightConnector1">
+            <a:avLst/>
+          </a:prstGeom>
+          <a:ln w="19050">
+            <a:solidFill>
+              <a:srgbClr val="0070C0"/>
+            </a:solidFill>
+            <a:prstDash val="sysDash"/>
+            <a:tailEnd type="arrow"/>
+          </a:ln>
+        </p:spPr>
+        <p:style>
+          <a:lnRef idx="1">
+            <a:schemeClr val="accent1"/>
+          </a:lnRef>
+          <a:fillRef idx="0">
+            <a:schemeClr val="accent1"/>
+          </a:fillRef>
+          <a:effectRef idx="0">
+            <a:schemeClr val="accent1"/>
+          </a:effectRef>
+          <a:fontRef idx="minor">
+            <a:schemeClr val="tx1"/>
+          </a:fontRef>
+        </p:style>
+      </p:cxnSp>
+      <p:cxnSp>
+        <p:nvCxnSpPr>
+          <p:cNvPr id="64" name="Straight Arrow Connector 63"/>
+          <p:cNvCxnSpPr>
+            <a:cxnSpLocks/>
+          </p:cNvCxnSpPr>
+          <p:nvPr/>
+        </p:nvCxnSpPr>
+        <p:spPr>
+          <a:xfrm>
+            <a:off x="1691351" y="5034989"/>
+            <a:ext cx="2348067" cy="0"/>
+          </a:xfrm>
+          <a:prstGeom prst="straightConnector1">
+            <a:avLst/>
+          </a:prstGeom>
+          <a:ln w="19050">
+            <a:solidFill>
+              <a:srgbClr val="0070C0"/>
+            </a:solidFill>
+            <a:prstDash val="sysDash"/>
+            <a:headEnd type="arrow" w="med" len="med"/>
+            <a:tailEnd type="none" w="med" len="med"/>
+          </a:ln>
+        </p:spPr>
+        <p:style>
+          <a:lnRef idx="1">
+            <a:schemeClr val="accent1"/>
+          </a:lnRef>
+          <a:fillRef idx="0">
+            <a:schemeClr val="accent1"/>
+          </a:fillRef>
+          <a:effectRef idx="0">
+            <a:schemeClr val="accent1"/>
+          </a:effectRef>
+          <a:fontRef idx="minor">
+            <a:schemeClr val="tx1"/>
+          </a:fontRef>
+        </p:style>
+      </p:cxnSp>
+      <p:sp>
+        <p:nvSpPr>
+          <p:cNvPr id="68" name="TextBox 67"/>
+          <p:cNvSpPr txBox="1"/>
+          <p:nvPr/>
+        </p:nvSpPr>
+        <p:spPr>
+          <a:xfrm>
+            <a:off x="2128060" y="4816561"/>
+            <a:ext cx="1634150" cy="215444"/>
+          </a:xfrm>
+          <a:prstGeom prst="rect">
+            <a:avLst/>
+          </a:prstGeom>
+          <a:noFill/>
+        </p:spPr>
+        <p:txBody>
+          <a:bodyPr wrap="square" lIns="0" tIns="0" rIns="0" bIns="0" rtlCol="0">
+            <a:spAutoFit/>
+          </a:bodyPr>
+          <a:lstStyle>
+            <a:defPPr>
+              <a:defRPr lang="en-US"/>
+            </a:defPPr>
+            <a:lvl1pPr algn="r">
+              <a:defRPr sz="1400">
+                <a:solidFill>
+                  <a:srgbClr val="0070C0"/>
+                </a:solidFill>
+              </a:defRPr>
+            </a:lvl1pPr>
+          </a:lstStyle>
+          <a:p>
+            <a:r>
+              <a:rPr lang="en-US" dirty="0" err="1" smtClean="0"/>
+              <a:t>composedPredicate</a:t>
+            </a:r>
+            <a:endParaRPr lang="en-US" dirty="0"/>
+          </a:p>
+        </p:txBody>
+      </p:sp>
+      <p:sp>
+        <p:nvSpPr>
+          <p:cNvPr id="38" name="Snip Single Corner Rectangle 37"/>
+          <p:cNvSpPr/>
+          <p:nvPr/>
+        </p:nvSpPr>
+        <p:spPr>
+          <a:xfrm flipV="1">
+            <a:off x="483860" y="2647106"/>
+            <a:ext cx="632695" cy="323484"/>
+          </a:xfrm>
+          <a:prstGeom prst="snip1Rect">
+            <a:avLst>
+              <a:gd name="adj" fmla="val 29067"/>
+            </a:avLst>
+          </a:prstGeom>
+          <a:solidFill>
+            <a:schemeClr val="bg1"/>
+          </a:solidFill>
+          <a:ln w="28575">
+            <a:solidFill>
+              <a:schemeClr val="tx1"/>
+            </a:solidFill>
+          </a:ln>
+        </p:spPr>
+        <p:style>
+          <a:lnRef idx="2">
+            <a:schemeClr val="accent1">
+              <a:shade val="50000"/>
+            </a:schemeClr>
+          </a:lnRef>
+          <a:fillRef idx="1">
+            <a:schemeClr val="accent1"/>
+          </a:fillRef>
+          <a:effectRef idx="0">
+            <a:schemeClr val="accent1"/>
+          </a:effectRef>
+          <a:fontRef idx="minor">
+            <a:schemeClr val="lt1"/>
+          </a:fontRef>
+        </p:style>
+        <p:txBody>
+          <a:bodyPr rtlCol="0" anchor="ctr"/>
+          <a:lstStyle/>
+          <a:p>
+            <a:pPr algn="ctr"/>
+            <a:endParaRPr lang="en-SG" dirty="0"/>
+          </a:p>
+        </p:txBody>
+      </p:sp>
+      <p:sp>
+        <p:nvSpPr>
+          <p:cNvPr id="72" name="TextBox 71"/>
+          <p:cNvSpPr txBox="1"/>
+          <p:nvPr/>
+        </p:nvSpPr>
+        <p:spPr>
+          <a:xfrm>
+            <a:off x="636465" y="2704037"/>
+            <a:ext cx="2918192" cy="215444"/>
+          </a:xfrm>
+          <a:prstGeom prst="rect">
+            <a:avLst/>
+          </a:prstGeom>
+          <a:noFill/>
+        </p:spPr>
+        <p:txBody>
+          <a:bodyPr wrap="square" lIns="0" tIns="0" rIns="0" bIns="0" rtlCol="0">
+            <a:spAutoFit/>
+          </a:bodyPr>
+          <a:lstStyle>
+            <a:defPPr>
+              <a:defRPr lang="en-US"/>
+            </a:defPPr>
+            <a:lvl1pPr algn="r">
+              <a:defRPr sz="1400">
+                <a:solidFill>
+                  <a:srgbClr val="0070C0"/>
+                </a:solidFill>
+              </a:defRPr>
+            </a:lvl1pPr>
+          </a:lstStyle>
+          <a:p>
+            <a:pPr algn="l"/>
+            <a:r>
+              <a:rPr lang="en-US" dirty="0" smtClean="0">
+                <a:solidFill>
+                  <a:schemeClr val="tx1"/>
+                </a:solidFill>
+              </a:rPr>
+              <a:t>loop      </a:t>
+            </a:r>
+            <a:r>
+              <a:rPr lang="en-US" dirty="0" smtClean="0">
+                <a:solidFill>
+                  <a:schemeClr val="tx1"/>
+                </a:solidFill>
+                <a:effectLst>
+                  <a:glow rad="127000">
+                    <a:schemeClr val="accent1">
+                      <a:lumMod val="20000"/>
+                      <a:lumOff val="80000"/>
+                    </a:schemeClr>
+                  </a:glow>
+                </a:effectLst>
+              </a:rPr>
+              <a:t>[until end of filter expression]</a:t>
+            </a:r>
+            <a:endParaRPr lang="en-US" dirty="0">
+              <a:solidFill>
+                <a:schemeClr val="tx1"/>
+              </a:solidFill>
+              <a:effectLst>
+                <a:glow rad="127000">
+                  <a:schemeClr val="accent1">
+                    <a:lumMod val="20000"/>
+                    <a:lumOff val="80000"/>
+                  </a:schemeClr>
+                </a:glow>
+              </a:effectLst>
+            </a:endParaRPr>
+          </a:p>
+        </p:txBody>
+      </p:sp>
+      <p:sp>
+        <p:nvSpPr>
+          <p:cNvPr id="39" name="Rectangle 62"/>
+          <p:cNvSpPr/>
+          <p:nvPr/>
+        </p:nvSpPr>
+        <p:spPr>
+          <a:xfrm>
+            <a:off x="2778386" y="1387272"/>
+            <a:ext cx="2705136" cy="336834"/>
+          </a:xfrm>
+          <a:prstGeom prst="rect">
+            <a:avLst/>
+          </a:prstGeom>
+          <a:solidFill>
+            <a:srgbClr val="0070C0"/>
+          </a:solidFill>
+          <a:ln w="19050">
+            <a:solidFill>
+              <a:srgbClr val="0070C0"/>
             </a:solidFill>
           </a:ln>
           <a:effectLst/>
@@ -4286,14 +4982,22 @@
           <a:p>
             <a:pPr algn="ctr"/>
             <a:r>
-              <a:rPr lang="en-US" sz="1600" dirty="0" smtClean="0">
+              <a:rPr lang="en-US" sz="1500" dirty="0" smtClean="0">
                 <a:solidFill>
                   <a:schemeClr val="bg1"/>
                 </a:solidFill>
               </a:rPr>
-              <a:t>Field</a:t>
-            </a:r>
-            <a:endParaRPr lang="en-SG" sz="1600" dirty="0">
+              <a:t>:</a:t>
+            </a:r>
+            <a:r>
+              <a:rPr lang="en-US" sz="1500" dirty="0" smtClean="0">
+                <a:solidFill>
+                  <a:schemeClr val="bg1"/>
+                </a:solidFill>
+              </a:rPr>
+              <a:t>BooleanExpressionParser&lt;Task&gt;</a:t>
+            </a:r>
+            <a:endParaRPr lang="en-SG" sz="1500" dirty="0">
               <a:solidFill>
                 <a:schemeClr val="bg1"/>
               </a:solidFill>
@@ -4301,66 +5005,26 @@
           </a:p>
         </p:txBody>
       </p:sp>
-      <p:cxnSp>
-        <p:nvCxnSpPr>
-          <p:cNvPr id="46" name="Straight Connector 45"/>
-          <p:cNvCxnSpPr>
-            <a:cxnSpLocks/>
-            <a:stCxn id="40" idx="2"/>
-          </p:cNvCxnSpPr>
-          <p:nvPr/>
-        </p:nvCxnSpPr>
-        <p:spPr>
-          <a:xfrm>
-            <a:off x="7816423" y="2299297"/>
-            <a:ext cx="0" cy="2895104"/>
-          </a:xfrm>
-          <a:prstGeom prst="line">
-            <a:avLst/>
-          </a:prstGeom>
-          <a:ln w="19050">
-            <a:solidFill>
-              <a:srgbClr val="7030A0"/>
-            </a:solidFill>
-            <a:prstDash val="sysDash"/>
-          </a:ln>
-          <a:effectLst/>
-        </p:spPr>
-        <p:style>
-          <a:lnRef idx="1">
-            <a:schemeClr val="accent1"/>
-          </a:lnRef>
-          <a:fillRef idx="2">
-            <a:schemeClr val="accent1"/>
-          </a:fillRef>
-          <a:effectRef idx="1">
-            <a:schemeClr val="accent1"/>
-          </a:effectRef>
-          <a:fontRef idx="minor">
-            <a:schemeClr val="dk1"/>
-          </a:fontRef>
-        </p:style>
-      </p:cxnSp>
-      <p:sp>
-        <p:nvSpPr>
-          <p:cNvPr id="49" name="Rectangle 48"/>
+      <p:sp>
+        <p:nvSpPr>
+          <p:cNvPr id="41" name="Rectangle 40"/>
           <p:cNvSpPr/>
           <p:nvPr/>
         </p:nvSpPr>
         <p:spPr>
           <a:xfrm>
-            <a:off x="7713500" y="3522091"/>
-            <a:ext cx="168896" cy="528572"/>
+            <a:off x="4039418" y="1733916"/>
+            <a:ext cx="154479" cy="258778"/>
           </a:xfrm>
           <a:prstGeom prst="rect">
             <a:avLst/>
           </a:prstGeom>
           <a:solidFill>
-            <a:srgbClr val="7030A0"/>
+            <a:srgbClr val="0070C0"/>
           </a:solidFill>
           <a:ln>
             <a:solidFill>
-              <a:srgbClr val="7030A0"/>
+              <a:srgbClr val="0070C0"/>
             </a:solidFill>
           </a:ln>
           <a:effectLst/>
@@ -4384,6 +5048,1041 @@
           <a:lstStyle/>
           <a:p>
             <a:pPr algn="ctr"/>
+            <a:endParaRPr lang="en-SG" sz="1400">
+              <a:solidFill>
+                <a:schemeClr val="dk1"/>
+              </a:solidFill>
+            </a:endParaRPr>
+          </a:p>
+        </p:txBody>
+      </p:sp>
+      <p:cxnSp>
+        <p:nvCxnSpPr>
+          <p:cNvPr id="42" name="Straight Arrow Connector 41">
+            <a:extLst>
+              <a:ext uri="{FF2B5EF4-FFF2-40B4-BE49-F238E27FC236}">
+                <a16:creationId xmlns:a16="http://schemas.microsoft.com/office/drawing/2014/main" id="{D881596E-177C-4FDC-8E60-CAB90B3D5FAB}"/>
+              </a:ext>
+            </a:extLst>
+          </p:cNvPr>
+          <p:cNvCxnSpPr>
+            <a:cxnSpLocks/>
+            <a:endCxn id="39" idx="1"/>
+          </p:cNvCxnSpPr>
+          <p:nvPr/>
+        </p:nvCxnSpPr>
+        <p:spPr>
+          <a:xfrm>
+            <a:off x="1699798" y="1555689"/>
+            <a:ext cx="1078588" cy="0"/>
+          </a:xfrm>
+          <a:prstGeom prst="straightConnector1">
+            <a:avLst/>
+          </a:prstGeom>
+          <a:ln w="19050">
+            <a:solidFill>
+              <a:srgbClr val="0070C0"/>
+            </a:solidFill>
+            <a:tailEnd type="arrow"/>
+          </a:ln>
+        </p:spPr>
+        <p:style>
+          <a:lnRef idx="1">
+            <a:schemeClr val="accent1"/>
+          </a:lnRef>
+          <a:fillRef idx="0">
+            <a:schemeClr val="accent1"/>
+          </a:fillRef>
+          <a:effectRef idx="0">
+            <a:schemeClr val="accent1"/>
+          </a:effectRef>
+          <a:fontRef idx="minor">
+            <a:schemeClr val="tx1"/>
+          </a:fontRef>
+        </p:style>
+      </p:cxnSp>
+    </p:spTree>
+    <p:extLst>
+      <p:ext uri="{BB962C8B-B14F-4D97-AF65-F5344CB8AC3E}">
+        <p14:creationId xmlns:p14="http://schemas.microsoft.com/office/powerpoint/2010/main" val="1756267895"/>
+      </p:ext>
+    </p:extLst>
+  </p:cSld>
+  <p:clrMapOvr>
+    <a:masterClrMapping/>
+  </p:clrMapOvr>
+</p:sld>
+</file>
+
+<file path=ppt/slides/slide2.xml><?xml version="1.0" encoding="utf-8"?>
+<p:sld xmlns:a="http://schemas.openxmlformats.org/drawingml/2006/main" xmlns:r="http://schemas.openxmlformats.org/officeDocument/2006/relationships" xmlns:p="http://schemas.openxmlformats.org/presentationml/2006/main">
+  <p:cSld>
+    <p:spTree>
+      <p:nvGrpSpPr>
+        <p:cNvPr id="1" name=""/>
+        <p:cNvGrpSpPr/>
+        <p:nvPr/>
+      </p:nvGrpSpPr>
+      <p:grpSpPr>
+        <a:xfrm>
+          <a:off x="0" y="0"/>
+          <a:ext cx="0" cy="0"/>
+          <a:chOff x="0" y="0"/>
+          <a:chExt cx="0" cy="0"/>
+        </a:xfrm>
+      </p:grpSpPr>
+      <p:sp>
+        <p:nvSpPr>
+          <p:cNvPr id="56" name="Rectangle 65"/>
+          <p:cNvSpPr/>
+          <p:nvPr/>
+        </p:nvSpPr>
+        <p:spPr>
+          <a:xfrm>
+            <a:off x="5792626" y="163019"/>
+            <a:ext cx="4165731" cy="6694981"/>
+          </a:xfrm>
+          <a:prstGeom prst="roundRect">
+            <a:avLst>
+              <a:gd name="adj" fmla="val 10203"/>
+            </a:avLst>
+          </a:prstGeom>
+          <a:solidFill>
+            <a:schemeClr val="accent4">
+              <a:lumMod val="20000"/>
+              <a:lumOff val="80000"/>
+            </a:schemeClr>
+          </a:solidFill>
+          <a:ln w="19050">
+            <a:noFill/>
+          </a:ln>
+          <a:effectLst/>
+        </p:spPr>
+        <p:style>
+          <a:lnRef idx="1">
+            <a:schemeClr val="accent2"/>
+          </a:lnRef>
+          <a:fillRef idx="2">
+            <a:schemeClr val="accent2"/>
+          </a:fillRef>
+          <a:effectRef idx="1">
+            <a:schemeClr val="accent2"/>
+          </a:effectRef>
+          <a:fontRef idx="minor">
+            <a:schemeClr val="dk1"/>
+          </a:fontRef>
+        </p:style>
+        <p:txBody>
+          <a:bodyPr rtlCol="0" anchor="t"/>
+          <a:lstStyle/>
+          <a:p>
+            <a:r>
+              <a:rPr lang="en-US" sz="1200" b="1" dirty="0">
+                <a:solidFill>
+                  <a:srgbClr val="7030A0"/>
+                </a:solidFill>
+              </a:rPr>
+              <a:t>Model</a:t>
+            </a:r>
+            <a:endParaRPr lang="en-SG" sz="1200" b="1" dirty="0">
+              <a:solidFill>
+                <a:srgbClr val="7030A0"/>
+              </a:solidFill>
+            </a:endParaRPr>
+          </a:p>
+        </p:txBody>
+      </p:sp>
+      <p:sp>
+        <p:nvSpPr>
+          <p:cNvPr id="55" name="Rectangle 54"/>
+          <p:cNvSpPr/>
+          <p:nvPr/>
+        </p:nvSpPr>
+        <p:spPr>
+          <a:xfrm>
+            <a:off x="5915811" y="3595923"/>
+            <a:ext cx="3609189" cy="1315686"/>
+          </a:xfrm>
+          <a:prstGeom prst="rect">
+            <a:avLst/>
+          </a:prstGeom>
+          <a:noFill/>
+          <a:ln w="28575">
+            <a:solidFill>
+              <a:schemeClr val="tx1"/>
+            </a:solidFill>
+          </a:ln>
+        </p:spPr>
+        <p:style>
+          <a:lnRef idx="2">
+            <a:schemeClr val="accent1">
+              <a:shade val="50000"/>
+            </a:schemeClr>
+          </a:lnRef>
+          <a:fillRef idx="1">
+            <a:schemeClr val="accent1"/>
+          </a:fillRef>
+          <a:effectRef idx="0">
+            <a:schemeClr val="accent1"/>
+          </a:effectRef>
+          <a:fontRef idx="minor">
+            <a:schemeClr val="lt1"/>
+          </a:fontRef>
+        </p:style>
+        <p:txBody>
+          <a:bodyPr rtlCol="0" anchor="ctr"/>
+          <a:lstStyle/>
+          <a:p>
+            <a:pPr algn="ctr"/>
+            <a:endParaRPr lang="en-SG"/>
+          </a:p>
+        </p:txBody>
+      </p:sp>
+      <p:sp>
+        <p:nvSpPr>
+          <p:cNvPr id="81" name="Rectangle 65"/>
+          <p:cNvSpPr/>
+          <p:nvPr/>
+        </p:nvSpPr>
+        <p:spPr>
+          <a:xfrm>
+            <a:off x="331665" y="163018"/>
+            <a:ext cx="5330391" cy="6694982"/>
+          </a:xfrm>
+          <a:prstGeom prst="roundRect">
+            <a:avLst>
+              <a:gd name="adj" fmla="val 4152"/>
+            </a:avLst>
+          </a:prstGeom>
+          <a:solidFill>
+            <a:schemeClr val="accent1">
+              <a:lumMod val="20000"/>
+              <a:lumOff val="80000"/>
+            </a:schemeClr>
+          </a:solidFill>
+          <a:ln w="19050">
+            <a:noFill/>
+          </a:ln>
+          <a:effectLst/>
+        </p:spPr>
+        <p:style>
+          <a:lnRef idx="1">
+            <a:schemeClr val="accent2"/>
+          </a:lnRef>
+          <a:fillRef idx="2">
+            <a:schemeClr val="accent2"/>
+          </a:fillRef>
+          <a:effectRef idx="1">
+            <a:schemeClr val="accent2"/>
+          </a:effectRef>
+          <a:fontRef idx="minor">
+            <a:schemeClr val="dk1"/>
+          </a:fontRef>
+        </p:style>
+        <p:txBody>
+          <a:bodyPr rtlCol="0" anchor="t"/>
+          <a:lstStyle/>
+          <a:p>
+            <a:r>
+              <a:rPr lang="en-US" sz="1200" b="1" dirty="0">
+                <a:solidFill>
+                  <a:srgbClr val="0070C0"/>
+                </a:solidFill>
+              </a:rPr>
+              <a:t>Logic</a:t>
+            </a:r>
+            <a:endParaRPr lang="en-SG" sz="1200" b="1" dirty="0">
+              <a:solidFill>
+                <a:srgbClr val="0070C0"/>
+              </a:solidFill>
+            </a:endParaRPr>
+          </a:p>
+        </p:txBody>
+      </p:sp>
+      <p:sp>
+        <p:nvSpPr>
+          <p:cNvPr id="36" name="Rectangle 35"/>
+          <p:cNvSpPr/>
+          <p:nvPr/>
+        </p:nvSpPr>
+        <p:spPr>
+          <a:xfrm>
+            <a:off x="636465" y="2317400"/>
+            <a:ext cx="9078021" cy="3576510"/>
+          </a:xfrm>
+          <a:prstGeom prst="rect">
+            <a:avLst/>
+          </a:prstGeom>
+          <a:noFill/>
+          <a:ln w="28575">
+            <a:solidFill>
+              <a:schemeClr val="tx1"/>
+            </a:solidFill>
+          </a:ln>
+        </p:spPr>
+        <p:style>
+          <a:lnRef idx="2">
+            <a:schemeClr val="accent1">
+              <a:shade val="50000"/>
+            </a:schemeClr>
+          </a:lnRef>
+          <a:fillRef idx="1">
+            <a:schemeClr val="accent1"/>
+          </a:fillRef>
+          <a:effectRef idx="0">
+            <a:schemeClr val="accent1"/>
+          </a:effectRef>
+          <a:fontRef idx="minor">
+            <a:schemeClr val="lt1"/>
+          </a:fontRef>
+        </p:style>
+        <p:txBody>
+          <a:bodyPr rtlCol="0" anchor="ctr"/>
+          <a:lstStyle/>
+          <a:p>
+            <a:pPr algn="ctr"/>
+            <a:endParaRPr lang="en-SG"/>
+          </a:p>
+        </p:txBody>
+      </p:sp>
+      <p:sp>
+        <p:nvSpPr>
+          <p:cNvPr id="2" name="Rectangle 62"/>
+          <p:cNvSpPr/>
+          <p:nvPr/>
+        </p:nvSpPr>
+        <p:spPr>
+          <a:xfrm>
+            <a:off x="597496" y="533400"/>
+            <a:ext cx="2026926" cy="346760"/>
+          </a:xfrm>
+          <a:prstGeom prst="rect">
+            <a:avLst/>
+          </a:prstGeom>
+          <a:solidFill>
+            <a:srgbClr val="0070C0"/>
+          </a:solidFill>
+          <a:ln w="19050">
+            <a:solidFill>
+              <a:srgbClr val="0070C0"/>
+            </a:solidFill>
+          </a:ln>
+          <a:effectLst/>
+        </p:spPr>
+        <p:style>
+          <a:lnRef idx="1">
+            <a:schemeClr val="accent2"/>
+          </a:lnRef>
+          <a:fillRef idx="2">
+            <a:schemeClr val="accent2"/>
+          </a:fillRef>
+          <a:effectRef idx="1">
+            <a:schemeClr val="accent2"/>
+          </a:effectRef>
+          <a:fontRef idx="minor">
+            <a:schemeClr val="dk1"/>
+          </a:fontRef>
+        </p:style>
+        <p:txBody>
+          <a:bodyPr rtlCol="0" anchor="ctr"/>
+          <a:lstStyle/>
+          <a:p>
+            <a:pPr algn="ctr"/>
+            <a:r>
+              <a:rPr lang="en-US" sz="1500" dirty="0" smtClean="0">
+                <a:solidFill>
+                  <a:schemeClr val="bg1"/>
+                </a:solidFill>
+              </a:rPr>
+              <a:t>:</a:t>
+            </a:r>
+            <a:r>
+              <a:rPr lang="en-US" sz="1500" dirty="0" err="1" smtClean="0">
+                <a:solidFill>
+                  <a:schemeClr val="bg1"/>
+                </a:solidFill>
+              </a:rPr>
+              <a:t>FilterCommandParser</a:t>
+            </a:r>
+            <a:endParaRPr lang="en-SG" sz="1500" dirty="0">
+              <a:solidFill>
+                <a:schemeClr val="bg1"/>
+              </a:solidFill>
+            </a:endParaRPr>
+          </a:p>
+        </p:txBody>
+      </p:sp>
+      <p:cxnSp>
+        <p:nvCxnSpPr>
+          <p:cNvPr id="5" name="Straight Connector 4"/>
+          <p:cNvCxnSpPr>
+            <a:cxnSpLocks/>
+          </p:cNvCxnSpPr>
+          <p:nvPr/>
+        </p:nvCxnSpPr>
+        <p:spPr>
+          <a:xfrm>
+            <a:off x="1610959" y="888284"/>
+            <a:ext cx="0" cy="5893516"/>
+          </a:xfrm>
+          <a:prstGeom prst="line">
+            <a:avLst/>
+          </a:prstGeom>
+          <a:ln w="19050">
+            <a:solidFill>
+              <a:srgbClr val="0070C0"/>
+            </a:solidFill>
+            <a:prstDash val="sysDash"/>
+          </a:ln>
+          <a:effectLst/>
+        </p:spPr>
+        <p:style>
+          <a:lnRef idx="1">
+            <a:schemeClr val="accent1"/>
+          </a:lnRef>
+          <a:fillRef idx="2">
+            <a:schemeClr val="accent1"/>
+          </a:fillRef>
+          <a:effectRef idx="1">
+            <a:schemeClr val="accent1"/>
+          </a:effectRef>
+          <a:fontRef idx="minor">
+            <a:schemeClr val="dk1"/>
+          </a:fontRef>
+        </p:style>
+      </p:cxnSp>
+      <p:sp>
+        <p:nvSpPr>
+          <p:cNvPr id="6" name="Rectangle 5"/>
+          <p:cNvSpPr/>
+          <p:nvPr/>
+        </p:nvSpPr>
+        <p:spPr>
+          <a:xfrm>
+            <a:off x="1538951" y="1193083"/>
+            <a:ext cx="152400" cy="5340731"/>
+          </a:xfrm>
+          <a:prstGeom prst="rect">
+            <a:avLst/>
+          </a:prstGeom>
+          <a:solidFill>
+            <a:srgbClr val="0070C0"/>
+          </a:solidFill>
+          <a:ln>
+            <a:solidFill>
+              <a:srgbClr val="0070C0"/>
+            </a:solidFill>
+          </a:ln>
+          <a:effectLst/>
+        </p:spPr>
+        <p:style>
+          <a:lnRef idx="1">
+            <a:schemeClr val="accent3"/>
+          </a:lnRef>
+          <a:fillRef idx="2">
+            <a:schemeClr val="accent3"/>
+          </a:fillRef>
+          <a:effectRef idx="1">
+            <a:schemeClr val="accent3"/>
+          </a:effectRef>
+          <a:fontRef idx="minor">
+            <a:schemeClr val="dk1"/>
+          </a:fontRef>
+        </p:style>
+        <p:txBody>
+          <a:bodyPr rtlCol="0" anchor="ctr"/>
+          <a:lstStyle/>
+          <a:p>
+            <a:pPr algn="ctr"/>
+            <a:endParaRPr lang="en-SG" sz="1400"/>
+          </a:p>
+        </p:txBody>
+      </p:sp>
+      <p:sp>
+        <p:nvSpPr>
+          <p:cNvPr id="16" name="Rectangle 62"/>
+          <p:cNvSpPr/>
+          <p:nvPr/>
+        </p:nvSpPr>
+        <p:spPr>
+          <a:xfrm>
+            <a:off x="2778386" y="1199181"/>
+            <a:ext cx="2705136" cy="336834"/>
+          </a:xfrm>
+          <a:prstGeom prst="rect">
+            <a:avLst/>
+          </a:prstGeom>
+          <a:solidFill>
+            <a:srgbClr val="0070C0"/>
+          </a:solidFill>
+          <a:ln w="19050">
+            <a:solidFill>
+              <a:srgbClr val="0070C0"/>
+            </a:solidFill>
+          </a:ln>
+          <a:effectLst/>
+        </p:spPr>
+        <p:style>
+          <a:lnRef idx="1">
+            <a:schemeClr val="accent2"/>
+          </a:lnRef>
+          <a:fillRef idx="2">
+            <a:schemeClr val="accent2"/>
+          </a:fillRef>
+          <a:effectRef idx="1">
+            <a:schemeClr val="accent2"/>
+          </a:effectRef>
+          <a:fontRef idx="minor">
+            <a:schemeClr val="dk1"/>
+          </a:fontRef>
+        </p:style>
+        <p:txBody>
+          <a:bodyPr rtlCol="0" anchor="ctr"/>
+          <a:lstStyle/>
+          <a:p>
+            <a:pPr algn="ctr"/>
+            <a:r>
+              <a:rPr lang="en-US" sz="1500" dirty="0" smtClean="0">
+                <a:solidFill>
+                  <a:schemeClr val="bg1"/>
+                </a:solidFill>
+              </a:rPr>
+              <a:t>:</a:t>
+            </a:r>
+            <a:r>
+              <a:rPr lang="en-US" sz="1500" dirty="0" smtClean="0">
+                <a:solidFill>
+                  <a:schemeClr val="bg1"/>
+                </a:solidFill>
+              </a:rPr>
+              <a:t>BooleanExpressionParser&lt;Task&gt;</a:t>
+            </a:r>
+            <a:endParaRPr lang="en-SG" sz="1500" dirty="0">
+              <a:solidFill>
+                <a:schemeClr val="bg1"/>
+              </a:solidFill>
+            </a:endParaRPr>
+          </a:p>
+        </p:txBody>
+      </p:sp>
+      <p:cxnSp>
+        <p:nvCxnSpPr>
+          <p:cNvPr id="17" name="Straight Connector 16"/>
+          <p:cNvCxnSpPr>
+            <a:cxnSpLocks/>
+            <a:stCxn id="16" idx="2"/>
+            <a:endCxn id="4" idx="0"/>
+          </p:cNvCxnSpPr>
+          <p:nvPr/>
+        </p:nvCxnSpPr>
+        <p:spPr>
+          <a:xfrm flipH="1">
+            <a:off x="4113568" y="1536015"/>
+            <a:ext cx="17386" cy="4907975"/>
+          </a:xfrm>
+          <a:prstGeom prst="line">
+            <a:avLst/>
+          </a:prstGeom>
+          <a:ln w="19050">
+            <a:solidFill>
+              <a:srgbClr val="0070C0"/>
+            </a:solidFill>
+            <a:prstDash val="sysDash"/>
+          </a:ln>
+          <a:effectLst/>
+        </p:spPr>
+        <p:style>
+          <a:lnRef idx="1">
+            <a:schemeClr val="accent1"/>
+          </a:lnRef>
+          <a:fillRef idx="2">
+            <a:schemeClr val="accent1"/>
+          </a:fillRef>
+          <a:effectRef idx="1">
+            <a:schemeClr val="accent1"/>
+          </a:effectRef>
+          <a:fontRef idx="minor">
+            <a:schemeClr val="dk1"/>
+          </a:fontRef>
+        </p:style>
+      </p:cxnSp>
+      <p:sp>
+        <p:nvSpPr>
+          <p:cNvPr id="18" name="Rectangle 17"/>
+          <p:cNvSpPr/>
+          <p:nvPr/>
+        </p:nvSpPr>
+        <p:spPr>
+          <a:xfrm>
+            <a:off x="4039418" y="1544192"/>
+            <a:ext cx="154479" cy="117586"/>
+          </a:xfrm>
+          <a:prstGeom prst="rect">
+            <a:avLst/>
+          </a:prstGeom>
+          <a:solidFill>
+            <a:srgbClr val="0070C0"/>
+          </a:solidFill>
+          <a:ln>
+            <a:solidFill>
+              <a:srgbClr val="0070C0"/>
+            </a:solidFill>
+          </a:ln>
+          <a:effectLst/>
+        </p:spPr>
+        <p:style>
+          <a:lnRef idx="1">
+            <a:schemeClr val="accent3"/>
+          </a:lnRef>
+          <a:fillRef idx="2">
+            <a:schemeClr val="accent3"/>
+          </a:fillRef>
+          <a:effectRef idx="1">
+            <a:schemeClr val="accent3"/>
+          </a:effectRef>
+          <a:fontRef idx="minor">
+            <a:schemeClr val="dk1"/>
+          </a:fontRef>
+        </p:style>
+        <p:txBody>
+          <a:bodyPr rtlCol="0" anchor="ctr"/>
+          <a:lstStyle/>
+          <a:p>
+            <a:pPr algn="ctr"/>
+            <a:endParaRPr lang="en-SG" sz="1400">
+              <a:solidFill>
+                <a:schemeClr val="dk1"/>
+              </a:solidFill>
+            </a:endParaRPr>
+          </a:p>
+        </p:txBody>
+      </p:sp>
+      <p:cxnSp>
+        <p:nvCxnSpPr>
+          <p:cNvPr id="23" name="Straight Arrow Connector 22"/>
+          <p:cNvCxnSpPr/>
+          <p:nvPr/>
+        </p:nvCxnSpPr>
+        <p:spPr>
+          <a:xfrm>
+            <a:off x="218580" y="1199181"/>
+            <a:ext cx="1320371" cy="0"/>
+          </a:xfrm>
+          <a:prstGeom prst="straightConnector1">
+            <a:avLst/>
+          </a:prstGeom>
+          <a:ln w="19050">
+            <a:solidFill>
+              <a:srgbClr val="00B050"/>
+            </a:solidFill>
+            <a:tailEnd type="arrow"/>
+          </a:ln>
+        </p:spPr>
+        <p:style>
+          <a:lnRef idx="1">
+            <a:schemeClr val="accent1"/>
+          </a:lnRef>
+          <a:fillRef idx="0">
+            <a:schemeClr val="accent1"/>
+          </a:fillRef>
+          <a:effectRef idx="0">
+            <a:schemeClr val="accent1"/>
+          </a:effectRef>
+          <a:fontRef idx="minor">
+            <a:schemeClr val="tx1"/>
+          </a:fontRef>
+        </p:style>
+      </p:cxnSp>
+      <p:sp>
+        <p:nvSpPr>
+          <p:cNvPr id="26" name="TextBox 25"/>
+          <p:cNvSpPr txBox="1"/>
+          <p:nvPr/>
+        </p:nvSpPr>
+        <p:spPr>
+          <a:xfrm>
+            <a:off x="38100" y="927782"/>
+            <a:ext cx="1424846" cy="215444"/>
+          </a:xfrm>
+          <a:prstGeom prst="rect">
+            <a:avLst/>
+          </a:prstGeom>
+          <a:noFill/>
+        </p:spPr>
+        <p:txBody>
+          <a:bodyPr wrap="square" lIns="0" tIns="0" rIns="0" bIns="0" rtlCol="0">
+            <a:spAutoFit/>
+          </a:bodyPr>
+          <a:lstStyle/>
+          <a:p>
+            <a:pPr algn="r"/>
+            <a:r>
+              <a:rPr lang="en-US" sz="1400" dirty="0" smtClean="0">
+                <a:solidFill>
+                  <a:srgbClr val="0070C0"/>
+                </a:solidFill>
+              </a:rPr>
+              <a:t>parse()</a:t>
+            </a:r>
+            <a:endParaRPr lang="en-US" sz="1400" dirty="0">
+              <a:solidFill>
+                <a:srgbClr val="0070C0"/>
+              </a:solidFill>
+            </a:endParaRPr>
+          </a:p>
+        </p:txBody>
+      </p:sp>
+      <p:sp>
+        <p:nvSpPr>
+          <p:cNvPr id="29" name="TextBox 28"/>
+          <p:cNvSpPr txBox="1"/>
+          <p:nvPr/>
+        </p:nvSpPr>
+        <p:spPr>
+          <a:xfrm>
+            <a:off x="2382835" y="1801166"/>
+            <a:ext cx="1325321" cy="215444"/>
+          </a:xfrm>
+          <a:prstGeom prst="rect">
+            <a:avLst/>
+          </a:prstGeom>
+          <a:noFill/>
+        </p:spPr>
+        <p:txBody>
+          <a:bodyPr wrap="square" lIns="0" tIns="0" rIns="0" bIns="0" rtlCol="0">
+            <a:spAutoFit/>
+          </a:bodyPr>
+          <a:lstStyle>
+            <a:defPPr>
+              <a:defRPr lang="en-US"/>
+            </a:defPPr>
+            <a:lvl1pPr algn="r">
+              <a:defRPr sz="1400">
+                <a:solidFill>
+                  <a:srgbClr val="0070C0"/>
+                </a:solidFill>
+              </a:defRPr>
+            </a:lvl1pPr>
+          </a:lstStyle>
+          <a:p>
+            <a:r>
+              <a:rPr lang="en-US" dirty="0" smtClean="0"/>
+              <a:t>parse(expression)</a:t>
+            </a:r>
+            <a:endParaRPr lang="en-US" dirty="0"/>
+          </a:p>
+        </p:txBody>
+      </p:sp>
+      <p:cxnSp>
+        <p:nvCxnSpPr>
+          <p:cNvPr id="35" name="Straight Arrow Connector 34"/>
+          <p:cNvCxnSpPr>
+            <a:cxnSpLocks/>
+          </p:cNvCxnSpPr>
+          <p:nvPr/>
+        </p:nvCxnSpPr>
+        <p:spPr>
+          <a:xfrm>
+            <a:off x="1691351" y="1674063"/>
+            <a:ext cx="2348067" cy="0"/>
+          </a:xfrm>
+          <a:prstGeom prst="straightConnector1">
+            <a:avLst/>
+          </a:prstGeom>
+          <a:ln w="19050">
+            <a:solidFill>
+              <a:srgbClr val="0070C0"/>
+            </a:solidFill>
+            <a:prstDash val="sysDash"/>
+            <a:headEnd type="arrow" w="med" len="med"/>
+            <a:tailEnd type="none" w="med" len="med"/>
+          </a:ln>
+        </p:spPr>
+        <p:style>
+          <a:lnRef idx="1">
+            <a:schemeClr val="accent1"/>
+          </a:lnRef>
+          <a:fillRef idx="0">
+            <a:schemeClr val="accent1"/>
+          </a:fillRef>
+          <a:effectRef idx="0">
+            <a:schemeClr val="accent1"/>
+          </a:effectRef>
+          <a:fontRef idx="minor">
+            <a:schemeClr val="tx1"/>
+          </a:fontRef>
+        </p:style>
+      </p:cxnSp>
+      <p:cxnSp>
+        <p:nvCxnSpPr>
+          <p:cNvPr id="37" name="Straight Arrow Connector 36"/>
+          <p:cNvCxnSpPr/>
+          <p:nvPr/>
+        </p:nvCxnSpPr>
+        <p:spPr>
+          <a:xfrm>
+            <a:off x="218580" y="6533815"/>
+            <a:ext cx="1310696" cy="0"/>
+          </a:xfrm>
+          <a:prstGeom prst="straightConnector1">
+            <a:avLst/>
+          </a:prstGeom>
+          <a:ln w="19050">
+            <a:solidFill>
+              <a:schemeClr val="accent1"/>
+            </a:solidFill>
+            <a:prstDash val="sysDash"/>
+            <a:headEnd type="arrow" w="med" len="med"/>
+            <a:tailEnd type="none" w="med" len="med"/>
+          </a:ln>
+        </p:spPr>
+        <p:style>
+          <a:lnRef idx="1">
+            <a:schemeClr val="accent1"/>
+          </a:lnRef>
+          <a:fillRef idx="0">
+            <a:schemeClr val="accent1"/>
+          </a:fillRef>
+          <a:effectRef idx="0">
+            <a:schemeClr val="accent1"/>
+          </a:effectRef>
+          <a:fontRef idx="minor">
+            <a:schemeClr val="tx1"/>
+          </a:fontRef>
+        </p:style>
+      </p:cxnSp>
+      <p:sp>
+        <p:nvSpPr>
+          <p:cNvPr id="82" name="TextBox 81"/>
+          <p:cNvSpPr txBox="1"/>
+          <p:nvPr/>
+        </p:nvSpPr>
+        <p:spPr>
+          <a:xfrm>
+            <a:off x="4546865" y="5201592"/>
+            <a:ext cx="969760" cy="215444"/>
+          </a:xfrm>
+          <a:prstGeom prst="rect">
+            <a:avLst/>
+          </a:prstGeom>
+          <a:noFill/>
+        </p:spPr>
+        <p:txBody>
+          <a:bodyPr wrap="square" lIns="0" tIns="0" rIns="0" bIns="0" rtlCol="0">
+            <a:spAutoFit/>
+          </a:bodyPr>
+          <a:lstStyle>
+            <a:defPPr>
+              <a:defRPr lang="en-US"/>
+            </a:defPPr>
+            <a:lvl1pPr algn="r">
+              <a:defRPr sz="1400">
+                <a:solidFill>
+                  <a:srgbClr val="0070C0"/>
+                </a:solidFill>
+              </a:defRPr>
+            </a:lvl1pPr>
+          </a:lstStyle>
+          <a:p>
+            <a:r>
+              <a:rPr lang="en-US" dirty="0" err="1" smtClean="0">
+                <a:solidFill>
+                  <a:srgbClr val="7030A0"/>
+                </a:solidFill>
+              </a:rPr>
+              <a:t>setPredicate</a:t>
+            </a:r>
+            <a:endParaRPr lang="en-US" dirty="0">
+              <a:solidFill>
+                <a:srgbClr val="7030A0"/>
+              </a:solidFill>
+            </a:endParaRPr>
+          </a:p>
+        </p:txBody>
+      </p:sp>
+      <p:sp>
+        <p:nvSpPr>
+          <p:cNvPr id="83" name="TextBox 82"/>
+          <p:cNvSpPr txBox="1"/>
+          <p:nvPr/>
+        </p:nvSpPr>
+        <p:spPr>
+          <a:xfrm>
+            <a:off x="218580" y="6318371"/>
+            <a:ext cx="1283296" cy="215444"/>
+          </a:xfrm>
+          <a:prstGeom prst="rect">
+            <a:avLst/>
+          </a:prstGeom>
+          <a:noFill/>
+        </p:spPr>
+        <p:txBody>
+          <a:bodyPr wrap="square" lIns="0" tIns="0" rIns="0" bIns="0" rtlCol="0">
+            <a:spAutoFit/>
+          </a:bodyPr>
+          <a:lstStyle>
+            <a:defPPr>
+              <a:defRPr lang="en-US"/>
+            </a:defPPr>
+            <a:lvl1pPr algn="r">
+              <a:defRPr sz="1400">
+                <a:solidFill>
+                  <a:srgbClr val="0070C0"/>
+                </a:solidFill>
+              </a:defRPr>
+            </a:lvl1pPr>
+          </a:lstStyle>
+          <a:p>
+            <a:r>
+              <a:rPr lang="en-US" dirty="0" err="1" smtClean="0"/>
+              <a:t>filterCommand</a:t>
+            </a:r>
+            <a:endParaRPr lang="en-US" dirty="0"/>
+          </a:p>
+        </p:txBody>
+      </p:sp>
+      <p:sp>
+        <p:nvSpPr>
+          <p:cNvPr id="40" name="Rectangle 62"/>
+          <p:cNvSpPr/>
+          <p:nvPr/>
+        </p:nvSpPr>
+        <p:spPr>
+          <a:xfrm>
+            <a:off x="8789328" y="1668201"/>
+            <a:ext cx="925158" cy="300180"/>
+          </a:xfrm>
+          <a:prstGeom prst="rect">
+            <a:avLst/>
+          </a:prstGeom>
+          <a:solidFill>
+            <a:srgbClr val="7030A0"/>
+          </a:solidFill>
+          <a:ln w="19050">
+            <a:solidFill>
+              <a:srgbClr val="7030A0"/>
+            </a:solidFill>
+          </a:ln>
+          <a:effectLst/>
+        </p:spPr>
+        <p:style>
+          <a:lnRef idx="1">
+            <a:schemeClr val="accent2"/>
+          </a:lnRef>
+          <a:fillRef idx="2">
+            <a:schemeClr val="accent2"/>
+          </a:fillRef>
+          <a:effectRef idx="1">
+            <a:schemeClr val="accent2"/>
+          </a:effectRef>
+          <a:fontRef idx="minor">
+            <a:schemeClr val="dk1"/>
+          </a:fontRef>
+        </p:style>
+        <p:txBody>
+          <a:bodyPr rtlCol="0" anchor="ctr"/>
+          <a:lstStyle/>
+          <a:p>
+            <a:pPr algn="ctr"/>
+            <a:r>
+              <a:rPr lang="en-US" sz="1600" dirty="0" smtClean="0">
+                <a:solidFill>
+                  <a:schemeClr val="bg1"/>
+                </a:solidFill>
+              </a:rPr>
+              <a:t>Field</a:t>
+            </a:r>
+            <a:endParaRPr lang="en-SG" sz="1600" dirty="0">
+              <a:solidFill>
+                <a:schemeClr val="bg1"/>
+              </a:solidFill>
+            </a:endParaRPr>
+          </a:p>
+        </p:txBody>
+      </p:sp>
+      <p:cxnSp>
+        <p:nvCxnSpPr>
+          <p:cNvPr id="46" name="Straight Connector 45"/>
+          <p:cNvCxnSpPr>
+            <a:cxnSpLocks/>
+            <a:stCxn id="40" idx="2"/>
+          </p:cNvCxnSpPr>
+          <p:nvPr/>
+        </p:nvCxnSpPr>
+        <p:spPr>
+          <a:xfrm>
+            <a:off x="9251907" y="1968381"/>
+            <a:ext cx="0" cy="4203819"/>
+          </a:xfrm>
+          <a:prstGeom prst="line">
+            <a:avLst/>
+          </a:prstGeom>
+          <a:ln w="19050">
+            <a:solidFill>
+              <a:srgbClr val="7030A0"/>
+            </a:solidFill>
+            <a:prstDash val="sysDash"/>
+          </a:ln>
+          <a:effectLst/>
+        </p:spPr>
+        <p:style>
+          <a:lnRef idx="1">
+            <a:schemeClr val="accent1"/>
+          </a:lnRef>
+          <a:fillRef idx="2">
+            <a:schemeClr val="accent1"/>
+          </a:fillRef>
+          <a:effectRef idx="1">
+            <a:schemeClr val="accent1"/>
+          </a:effectRef>
+          <a:fontRef idx="minor">
+            <a:schemeClr val="dk1"/>
+          </a:fontRef>
+        </p:style>
+      </p:cxnSp>
+      <p:sp>
+        <p:nvSpPr>
+          <p:cNvPr id="49" name="Rectangle 48"/>
+          <p:cNvSpPr/>
+          <p:nvPr/>
+        </p:nvSpPr>
+        <p:spPr>
+          <a:xfrm>
+            <a:off x="9167459" y="4370843"/>
+            <a:ext cx="168896" cy="384920"/>
+          </a:xfrm>
+          <a:prstGeom prst="rect">
+            <a:avLst/>
+          </a:prstGeom>
+          <a:solidFill>
+            <a:srgbClr val="7030A0"/>
+          </a:solidFill>
+          <a:ln>
+            <a:solidFill>
+              <a:srgbClr val="7030A0"/>
+            </a:solidFill>
+          </a:ln>
+          <a:effectLst/>
+        </p:spPr>
+        <p:style>
+          <a:lnRef idx="1">
+            <a:schemeClr val="accent3"/>
+          </a:lnRef>
+          <a:fillRef idx="2">
+            <a:schemeClr val="accent3"/>
+          </a:fillRef>
+          <a:effectRef idx="1">
+            <a:schemeClr val="accent3"/>
+          </a:effectRef>
+          <a:fontRef idx="minor">
+            <a:schemeClr val="dk1"/>
+          </a:fontRef>
+        </p:style>
+        <p:txBody>
+          <a:bodyPr rtlCol="0" anchor="ctr"/>
+          <a:lstStyle/>
+          <a:p>
+            <a:pPr algn="ctr"/>
             <a:endParaRPr lang="en-SG" sz="1400"/>
           </a:p>
         </p:txBody>
@@ -4398,8 +6097,8 @@
         </p:nvCxnSpPr>
         <p:spPr>
           <a:xfrm>
-            <a:off x="1769559" y="3533835"/>
-            <a:ext cx="5943941" cy="0"/>
+            <a:off x="1769559" y="3202919"/>
+            <a:ext cx="4931701" cy="0"/>
           </a:xfrm>
           <a:prstGeom prst="straightConnector1">
             <a:avLst/>
@@ -4434,7 +6133,7 @@
         </p:nvSpPr>
         <p:spPr>
           <a:xfrm>
-            <a:off x="3982763" y="5314460"/>
+            <a:off x="3982763" y="6443990"/>
             <a:ext cx="261610" cy="261610"/>
           </a:xfrm>
           <a:prstGeom prst="rect">
@@ -4475,7 +6174,7 @@
         </p:nvCxnSpPr>
         <p:spPr>
           <a:xfrm>
-            <a:off x="1691351" y="2355703"/>
+            <a:off x="1691351" y="2024787"/>
             <a:ext cx="2348067" cy="0"/>
           </a:xfrm>
           <a:prstGeom prst="straightConnector1">
@@ -4520,8 +6219,8 @@
         </p:nvCxnSpPr>
         <p:spPr>
           <a:xfrm>
-            <a:off x="1708245" y="1363918"/>
-            <a:ext cx="1073019" cy="3419"/>
+            <a:off x="1699798" y="1367598"/>
+            <a:ext cx="1078588" cy="0"/>
           </a:xfrm>
           <a:prstGeom prst="straightConnector1">
             <a:avLst/>
@@ -4564,8 +6263,8 @@
         </p:nvCxnSpPr>
         <p:spPr>
           <a:xfrm>
-            <a:off x="1769559" y="4050662"/>
-            <a:ext cx="6028389" cy="0"/>
+            <a:off x="1763898" y="5440899"/>
+            <a:ext cx="4937362" cy="0"/>
           </a:xfrm>
           <a:prstGeom prst="straightConnector1">
             <a:avLst/>
@@ -4602,8 +6301,8 @@
         </p:nvSpPr>
         <p:spPr>
           <a:xfrm>
-            <a:off x="4039489" y="2326518"/>
-            <a:ext cx="154408" cy="2720981"/>
+            <a:off x="4039489" y="1995602"/>
+            <a:ext cx="154408" cy="4281070"/>
           </a:xfrm>
           <a:prstGeom prst="rect">
             <a:avLst/>
@@ -4655,7 +6354,7 @@
         </p:nvCxnSpPr>
         <p:spPr>
           <a:xfrm>
-            <a:off x="1769559" y="3059754"/>
+            <a:off x="1769559" y="2889789"/>
             <a:ext cx="2274923" cy="0"/>
           </a:xfrm>
           <a:prstGeom prst="straightConnector1">
@@ -4693,7 +6392,7 @@
         </p:nvSpPr>
         <p:spPr>
           <a:xfrm>
-            <a:off x="2013430" y="2831947"/>
+            <a:off x="2013430" y="2661982"/>
             <a:ext cx="1948970" cy="215444"/>
           </a:xfrm>
           <a:prstGeom prst="rect">
@@ -4734,8 +6433,8 @@
         </p:nvSpPr>
         <p:spPr>
           <a:xfrm>
-            <a:off x="1615151" y="3044677"/>
-            <a:ext cx="154408" cy="1350998"/>
+            <a:off x="1615151" y="2881176"/>
+            <a:ext cx="154408" cy="2871978"/>
           </a:xfrm>
           <a:prstGeom prst="rect">
             <a:avLst/>
@@ -4788,8 +6487,8 @@
         </p:nvSpPr>
         <p:spPr>
           <a:xfrm>
-            <a:off x="4577433" y="3056749"/>
-            <a:ext cx="1955216" cy="430887"/>
+            <a:off x="4315052" y="2532726"/>
+            <a:ext cx="1955216" cy="646331"/>
           </a:xfrm>
           <a:prstGeom prst="rect">
             <a:avLst/>
@@ -4827,7 +6526,31 @@
             </a:r>
             <a:r>
               <a:rPr lang="en-US" dirty="0" smtClean="0"/>
-              <a:t>(op, </a:t>
+              <a:t>(</a:t>
+            </a:r>
+            <a:r>
+              <a:rPr lang="en-US" dirty="0" err="1" smtClean="0"/>
+              <a:t>clazz</a:t>
+            </a:r>
+            <a:r>
+              <a:rPr lang="en-US" dirty="0" smtClean="0"/>
+              <a:t>, </a:t>
+            </a:r>
+            <a:r>
+              <a:rPr lang="en-US" dirty="0" err="1" smtClean="0"/>
+              <a:t>setOp</a:t>
+            </a:r>
+            <a:r>
+              <a:rPr lang="en-US" dirty="0" smtClean="0"/>
+              <a:t>, </a:t>
+            </a:r>
+            <a:r>
+              <a:rPr lang="en-US" dirty="0" err="1" smtClean="0"/>
+              <a:t>filterOp</a:t>
+            </a:r>
+            <a:r>
+              <a:rPr lang="en-US" dirty="0" smtClean="0"/>
+              <a:t>, </a:t>
             </a:r>
             <a:r>
               <a:rPr lang="en-US" dirty="0" err="1" smtClean="0"/>
@@ -4849,8 +6572,8 @@
         </p:nvSpPr>
         <p:spPr>
           <a:xfrm>
-            <a:off x="2514600" y="4177579"/>
-            <a:ext cx="855809" cy="215444"/>
+            <a:off x="2375702" y="5537710"/>
+            <a:ext cx="990600" cy="215444"/>
           </a:xfrm>
           <a:prstGeom prst="rect">
             <a:avLst/>
@@ -4875,8 +6598,8 @@
           </a:lstStyle>
           <a:p>
             <a:r>
-              <a:rPr lang="en-US" dirty="0" smtClean="0"/>
-              <a:t>predicate</a:t>
+              <a:rPr lang="en-US" dirty="0" err="1" smtClean="0"/>
+              <a:t>setPredicate</a:t>
             </a:r>
             <a:endParaRPr lang="en-US" dirty="0"/>
           </a:p>
@@ -4898,7 +6621,7 @@
         </p:nvCxnSpPr>
         <p:spPr>
           <a:xfrm>
-            <a:off x="1763898" y="4399682"/>
+            <a:off x="1763898" y="5753154"/>
             <a:ext cx="2275520" cy="0"/>
           </a:xfrm>
           <a:prstGeom prst="straightConnector1">
@@ -4937,7 +6660,7 @@
         </p:nvCxnSpPr>
         <p:spPr>
           <a:xfrm>
-            <a:off x="1691351" y="5034989"/>
+            <a:off x="1691351" y="6279656"/>
             <a:ext cx="2348067" cy="0"/>
           </a:xfrm>
           <a:prstGeom prst="straightConnector1">
@@ -4975,7 +6698,7 @@
         </p:nvSpPr>
         <p:spPr>
           <a:xfrm>
-            <a:off x="2128060" y="4816561"/>
+            <a:off x="1991524" y="6061228"/>
             <a:ext cx="1634150" cy="215444"/>
           </a:xfrm>
           <a:prstGeom prst="rect">
@@ -5016,7 +6739,7 @@
         </p:nvSpPr>
         <p:spPr>
           <a:xfrm flipV="1">
-            <a:off x="750523" y="2648316"/>
+            <a:off x="636734" y="2317399"/>
             <a:ext cx="632695" cy="323484"/>
           </a:xfrm>
           <a:prstGeom prst="snip1Rect">
@@ -5066,8 +6789,8 @@
         </p:nvSpPr>
         <p:spPr>
           <a:xfrm>
-            <a:off x="738911" y="2705247"/>
-            <a:ext cx="490147" cy="215444"/>
+            <a:off x="789070" y="2373137"/>
+            <a:ext cx="2918192" cy="215444"/>
           </a:xfrm>
           <a:prstGeom prst="rect">
             <a:avLst/>
@@ -5091,18 +6814,1010 @@
             </a:lvl1pPr>
           </a:lstStyle>
           <a:p>
+            <a:pPr algn="l"/>
             <a:r>
               <a:rPr lang="en-US" dirty="0" smtClean="0">
                 <a:solidFill>
                   <a:schemeClr val="tx1"/>
                 </a:solidFill>
               </a:rPr>
-              <a:t>loop</a:t>
+              <a:t>loop      </a:t>
+            </a:r>
+            <a:r>
+              <a:rPr lang="en-US" dirty="0" smtClean="0">
+                <a:solidFill>
+                  <a:schemeClr val="tx1"/>
+                </a:solidFill>
+                <a:effectLst>
+                  <a:glow rad="127000">
+                    <a:schemeClr val="accent1">
+                      <a:lumMod val="20000"/>
+                      <a:lumOff val="80000"/>
+                    </a:schemeClr>
+                  </a:glow>
+                </a:effectLst>
+              </a:rPr>
+              <a:t>[until end of filter expression]</a:t>
             </a:r>
             <a:endParaRPr lang="en-US" dirty="0">
               <a:solidFill>
                 <a:schemeClr val="tx1"/>
               </a:solidFill>
+              <a:effectLst>
+                <a:glow rad="127000">
+                  <a:schemeClr val="accent1">
+                    <a:lumMod val="20000"/>
+                    <a:lumOff val="80000"/>
+                  </a:schemeClr>
+                </a:glow>
+              </a:effectLst>
+            </a:endParaRPr>
+          </a:p>
+        </p:txBody>
+      </p:sp>
+      <p:sp>
+        <p:nvSpPr>
+          <p:cNvPr id="41" name="Rectangle 62"/>
+          <p:cNvSpPr/>
+          <p:nvPr/>
+        </p:nvSpPr>
+        <p:spPr>
+          <a:xfrm>
+            <a:off x="6324600" y="1668201"/>
+            <a:ext cx="925158" cy="300180"/>
+          </a:xfrm>
+          <a:prstGeom prst="rect">
+            <a:avLst/>
+          </a:prstGeom>
+          <a:solidFill>
+            <a:srgbClr val="7030A0"/>
+          </a:solidFill>
+          <a:ln w="19050">
+            <a:solidFill>
+              <a:srgbClr val="7030A0"/>
+            </a:solidFill>
+          </a:ln>
+          <a:effectLst/>
+        </p:spPr>
+        <p:style>
+          <a:lnRef idx="1">
+            <a:schemeClr val="accent2"/>
+          </a:lnRef>
+          <a:fillRef idx="2">
+            <a:schemeClr val="accent2"/>
+          </a:fillRef>
+          <a:effectRef idx="1">
+            <a:schemeClr val="accent2"/>
+          </a:effectRef>
+          <a:fontRef idx="minor">
+            <a:schemeClr val="dk1"/>
+          </a:fontRef>
+        </p:style>
+        <p:txBody>
+          <a:bodyPr rtlCol="0" anchor="ctr"/>
+          <a:lstStyle/>
+          <a:p>
+            <a:pPr algn="ctr"/>
+            <a:r>
+              <a:rPr lang="en-US" sz="1600" dirty="0" err="1" smtClean="0">
+                <a:solidFill>
+                  <a:schemeClr val="bg1"/>
+                </a:solidFill>
+              </a:rPr>
+              <a:t>SetUtil</a:t>
+            </a:r>
+            <a:endParaRPr lang="en-SG" sz="1600" dirty="0">
+              <a:solidFill>
+                <a:schemeClr val="bg1"/>
+              </a:solidFill>
+            </a:endParaRPr>
+          </a:p>
+        </p:txBody>
+      </p:sp>
+      <p:cxnSp>
+        <p:nvCxnSpPr>
+          <p:cNvPr id="42" name="Straight Connector 41"/>
+          <p:cNvCxnSpPr>
+            <a:cxnSpLocks/>
+            <a:stCxn id="41" idx="2"/>
+          </p:cNvCxnSpPr>
+          <p:nvPr/>
+        </p:nvCxnSpPr>
+        <p:spPr>
+          <a:xfrm>
+            <a:off x="6787179" y="1968381"/>
+            <a:ext cx="0" cy="4203819"/>
+          </a:xfrm>
+          <a:prstGeom prst="line">
+            <a:avLst/>
+          </a:prstGeom>
+          <a:ln w="19050">
+            <a:solidFill>
+              <a:srgbClr val="7030A0"/>
+            </a:solidFill>
+            <a:prstDash val="sysDash"/>
+          </a:ln>
+          <a:effectLst/>
+        </p:spPr>
+        <p:style>
+          <a:lnRef idx="1">
+            <a:schemeClr val="accent1"/>
+          </a:lnRef>
+          <a:fillRef idx="2">
+            <a:schemeClr val="accent1"/>
+          </a:fillRef>
+          <a:effectRef idx="1">
+            <a:schemeClr val="accent1"/>
+          </a:effectRef>
+          <a:fontRef idx="minor">
+            <a:schemeClr val="dk1"/>
+          </a:fontRef>
+        </p:style>
+      </p:cxnSp>
+      <p:sp>
+        <p:nvSpPr>
+          <p:cNvPr id="43" name="Rectangle 42"/>
+          <p:cNvSpPr/>
+          <p:nvPr/>
+        </p:nvSpPr>
+        <p:spPr>
+          <a:xfrm>
+            <a:off x="6701260" y="3191173"/>
+            <a:ext cx="168896" cy="2241601"/>
+          </a:xfrm>
+          <a:prstGeom prst="rect">
+            <a:avLst/>
+          </a:prstGeom>
+          <a:solidFill>
+            <a:srgbClr val="7030A0"/>
+          </a:solidFill>
+          <a:ln>
+            <a:solidFill>
+              <a:srgbClr val="7030A0"/>
+            </a:solidFill>
+          </a:ln>
+          <a:effectLst/>
+        </p:spPr>
+        <p:style>
+          <a:lnRef idx="1">
+            <a:schemeClr val="accent3"/>
+          </a:lnRef>
+          <a:fillRef idx="2">
+            <a:schemeClr val="accent3"/>
+          </a:fillRef>
+          <a:effectRef idx="1">
+            <a:schemeClr val="accent3"/>
+          </a:effectRef>
+          <a:fontRef idx="minor">
+            <a:schemeClr val="dk1"/>
+          </a:fontRef>
+        </p:style>
+        <p:txBody>
+          <a:bodyPr rtlCol="0" anchor="ctr"/>
+          <a:lstStyle/>
+          <a:p>
+            <a:pPr algn="ctr"/>
+            <a:endParaRPr lang="en-SG" sz="1400"/>
+          </a:p>
+        </p:txBody>
+      </p:sp>
+      <p:sp>
+        <p:nvSpPr>
+          <p:cNvPr id="45" name="Rectangle 44"/>
+          <p:cNvSpPr/>
+          <p:nvPr/>
+        </p:nvSpPr>
+        <p:spPr>
+          <a:xfrm>
+            <a:off x="6792362" y="3415932"/>
+            <a:ext cx="154408" cy="1612962"/>
+          </a:xfrm>
+          <a:prstGeom prst="rect">
+            <a:avLst/>
+          </a:prstGeom>
+          <a:solidFill>
+            <a:srgbClr val="7030A0"/>
+          </a:solidFill>
+          <a:ln w="19050">
+            <a:solidFill>
+              <a:schemeClr val="accent4">
+                <a:lumMod val="20000"/>
+                <a:lumOff val="80000"/>
+              </a:schemeClr>
+            </a:solidFill>
+          </a:ln>
+          <a:effectLst/>
+        </p:spPr>
+        <p:style>
+          <a:lnRef idx="1">
+            <a:schemeClr val="accent3"/>
+          </a:lnRef>
+          <a:fillRef idx="2">
+            <a:schemeClr val="accent3"/>
+          </a:fillRef>
+          <a:effectRef idx="1">
+            <a:schemeClr val="accent3"/>
+          </a:effectRef>
+          <a:fontRef idx="minor">
+            <a:schemeClr val="dk1"/>
+          </a:fontRef>
+        </p:style>
+        <p:txBody>
+          <a:bodyPr rtlCol="0" anchor="ctr"/>
+          <a:lstStyle/>
+          <a:p>
+            <a:pPr algn="ctr"/>
+            <a:endParaRPr lang="en-SG" sz="1400">
+              <a:solidFill>
+                <a:schemeClr val="dk1"/>
+              </a:solidFill>
+            </a:endParaRPr>
+          </a:p>
+        </p:txBody>
+      </p:sp>
+      <p:sp>
+        <p:nvSpPr>
+          <p:cNvPr id="11" name="Freeform 10"/>
+          <p:cNvSpPr/>
+          <p:nvPr/>
+        </p:nvSpPr>
+        <p:spPr>
+          <a:xfrm>
+            <a:off x="6887903" y="3200477"/>
+            <a:ext cx="255113" cy="221457"/>
+          </a:xfrm>
+          <a:custGeom>
+            <a:avLst/>
+            <a:gdLst>
+              <a:gd name="connsiteX0" fmla="*/ 0 w 177847"/>
+              <a:gd name="connsiteY0" fmla="*/ 0 h 219075"/>
+              <a:gd name="connsiteX1" fmla="*/ 152400 w 177847"/>
+              <a:gd name="connsiteY1" fmla="*/ 28575 h 219075"/>
+              <a:gd name="connsiteX2" fmla="*/ 171450 w 177847"/>
+              <a:gd name="connsiteY2" fmla="*/ 142875 h 219075"/>
+              <a:gd name="connsiteX3" fmla="*/ 85725 w 177847"/>
+              <a:gd name="connsiteY3" fmla="*/ 219075 h 219075"/>
+              <a:gd name="connsiteX0" fmla="*/ 0 w 179251"/>
+              <a:gd name="connsiteY0" fmla="*/ 0 h 219075"/>
+              <a:gd name="connsiteX1" fmla="*/ 152400 w 179251"/>
+              <a:gd name="connsiteY1" fmla="*/ 28575 h 219075"/>
+              <a:gd name="connsiteX2" fmla="*/ 171450 w 179251"/>
+              <a:gd name="connsiteY2" fmla="*/ 142875 h 219075"/>
+              <a:gd name="connsiteX3" fmla="*/ 66675 w 179251"/>
+              <a:gd name="connsiteY3" fmla="*/ 219075 h 219075"/>
+              <a:gd name="connsiteX0" fmla="*/ 0 w 179251"/>
+              <a:gd name="connsiteY0" fmla="*/ 0 h 219075"/>
+              <a:gd name="connsiteX1" fmla="*/ 152400 w 179251"/>
+              <a:gd name="connsiteY1" fmla="*/ 28575 h 219075"/>
+              <a:gd name="connsiteX2" fmla="*/ 171450 w 179251"/>
+              <a:gd name="connsiteY2" fmla="*/ 142875 h 219075"/>
+              <a:gd name="connsiteX3" fmla="*/ 66675 w 179251"/>
+              <a:gd name="connsiteY3" fmla="*/ 219075 h 219075"/>
+              <a:gd name="connsiteX0" fmla="*/ 0 w 179251"/>
+              <a:gd name="connsiteY0" fmla="*/ 0 h 219075"/>
+              <a:gd name="connsiteX1" fmla="*/ 152400 w 179251"/>
+              <a:gd name="connsiteY1" fmla="*/ 28575 h 219075"/>
+              <a:gd name="connsiteX2" fmla="*/ 171450 w 179251"/>
+              <a:gd name="connsiteY2" fmla="*/ 142875 h 219075"/>
+              <a:gd name="connsiteX3" fmla="*/ 66675 w 179251"/>
+              <a:gd name="connsiteY3" fmla="*/ 219075 h 219075"/>
+              <a:gd name="connsiteX0" fmla="*/ 0 w 181063"/>
+              <a:gd name="connsiteY0" fmla="*/ 0 h 219075"/>
+              <a:gd name="connsiteX1" fmla="*/ 152400 w 181063"/>
+              <a:gd name="connsiteY1" fmla="*/ 28575 h 219075"/>
+              <a:gd name="connsiteX2" fmla="*/ 173831 w 181063"/>
+              <a:gd name="connsiteY2" fmla="*/ 147637 h 219075"/>
+              <a:gd name="connsiteX3" fmla="*/ 66675 w 181063"/>
+              <a:gd name="connsiteY3" fmla="*/ 219075 h 219075"/>
+              <a:gd name="connsiteX0" fmla="*/ 0 w 247250"/>
+              <a:gd name="connsiteY0" fmla="*/ 0 h 219075"/>
+              <a:gd name="connsiteX1" fmla="*/ 152400 w 247250"/>
+              <a:gd name="connsiteY1" fmla="*/ 28575 h 219075"/>
+              <a:gd name="connsiteX2" fmla="*/ 245269 w 247250"/>
+              <a:gd name="connsiteY2" fmla="*/ 161924 h 219075"/>
+              <a:gd name="connsiteX3" fmla="*/ 66675 w 247250"/>
+              <a:gd name="connsiteY3" fmla="*/ 219075 h 219075"/>
+              <a:gd name="connsiteX0" fmla="*/ 0 w 267747"/>
+              <a:gd name="connsiteY0" fmla="*/ 0 h 219075"/>
+              <a:gd name="connsiteX1" fmla="*/ 238125 w 267747"/>
+              <a:gd name="connsiteY1" fmla="*/ 28575 h 219075"/>
+              <a:gd name="connsiteX2" fmla="*/ 245269 w 267747"/>
+              <a:gd name="connsiteY2" fmla="*/ 161924 h 219075"/>
+              <a:gd name="connsiteX3" fmla="*/ 66675 w 267747"/>
+              <a:gd name="connsiteY3" fmla="*/ 219075 h 219075"/>
+              <a:gd name="connsiteX0" fmla="*/ 0 w 255113"/>
+              <a:gd name="connsiteY0" fmla="*/ 0 h 221457"/>
+              <a:gd name="connsiteX1" fmla="*/ 226219 w 255113"/>
+              <a:gd name="connsiteY1" fmla="*/ 30957 h 221457"/>
+              <a:gd name="connsiteX2" fmla="*/ 233363 w 255113"/>
+              <a:gd name="connsiteY2" fmla="*/ 164306 h 221457"/>
+              <a:gd name="connsiteX3" fmla="*/ 54769 w 255113"/>
+              <a:gd name="connsiteY3" fmla="*/ 221457 h 221457"/>
+            </a:gdLst>
+            <a:ahLst/>
+            <a:cxnLst>
+              <a:cxn ang="0">
+                <a:pos x="connsiteX0" y="connsiteY0"/>
+              </a:cxn>
+              <a:cxn ang="0">
+                <a:pos x="connsiteX1" y="connsiteY1"/>
+              </a:cxn>
+              <a:cxn ang="0">
+                <a:pos x="connsiteX2" y="connsiteY2"/>
+              </a:cxn>
+              <a:cxn ang="0">
+                <a:pos x="connsiteX3" y="connsiteY3"/>
+              </a:cxn>
+            </a:cxnLst>
+            <a:rect l="l" t="t" r="r" b="b"/>
+            <a:pathLst>
+              <a:path w="255113" h="221457">
+                <a:moveTo>
+                  <a:pt x="0" y="0"/>
+                </a:moveTo>
+                <a:cubicBezTo>
+                  <a:pt x="61912" y="2381"/>
+                  <a:pt x="187325" y="3573"/>
+                  <a:pt x="226219" y="30957"/>
+                </a:cubicBezTo>
+                <a:cubicBezTo>
+                  <a:pt x="265113" y="58341"/>
+                  <a:pt x="261938" y="132556"/>
+                  <a:pt x="233363" y="164306"/>
+                </a:cubicBezTo>
+                <a:cubicBezTo>
+                  <a:pt x="204788" y="196056"/>
+                  <a:pt x="106362" y="213520"/>
+                  <a:pt x="54769" y="221457"/>
+                </a:cubicBezTo>
+              </a:path>
+            </a:pathLst>
+          </a:custGeom>
+          <a:noFill/>
+          <a:ln w="19050">
+            <a:solidFill>
+              <a:srgbClr val="7030A0"/>
+            </a:solidFill>
+            <a:tailEnd type="arrow"/>
+          </a:ln>
+        </p:spPr>
+        <p:style>
+          <a:lnRef idx="2">
+            <a:schemeClr val="accent1">
+              <a:shade val="50000"/>
+            </a:schemeClr>
+          </a:lnRef>
+          <a:fillRef idx="1">
+            <a:schemeClr val="accent1"/>
+          </a:fillRef>
+          <a:effectRef idx="0">
+            <a:schemeClr val="accent1"/>
+          </a:effectRef>
+          <a:fontRef idx="minor">
+            <a:schemeClr val="lt1"/>
+          </a:fontRef>
+        </p:style>
+        <p:txBody>
+          <a:bodyPr rtlCol="0" anchor="ctr"/>
+          <a:lstStyle/>
+          <a:p>
+            <a:pPr algn="ctr"/>
+            <a:endParaRPr lang="en-SG"/>
+          </a:p>
+        </p:txBody>
+      </p:sp>
+      <p:sp>
+        <p:nvSpPr>
+          <p:cNvPr id="48" name="Freeform 47"/>
+          <p:cNvSpPr/>
+          <p:nvPr/>
+        </p:nvSpPr>
+        <p:spPr>
+          <a:xfrm flipV="1">
+            <a:off x="6894999" y="5037018"/>
+            <a:ext cx="255113" cy="221457"/>
+          </a:xfrm>
+          <a:custGeom>
+            <a:avLst/>
+            <a:gdLst>
+              <a:gd name="connsiteX0" fmla="*/ 0 w 177847"/>
+              <a:gd name="connsiteY0" fmla="*/ 0 h 219075"/>
+              <a:gd name="connsiteX1" fmla="*/ 152400 w 177847"/>
+              <a:gd name="connsiteY1" fmla="*/ 28575 h 219075"/>
+              <a:gd name="connsiteX2" fmla="*/ 171450 w 177847"/>
+              <a:gd name="connsiteY2" fmla="*/ 142875 h 219075"/>
+              <a:gd name="connsiteX3" fmla="*/ 85725 w 177847"/>
+              <a:gd name="connsiteY3" fmla="*/ 219075 h 219075"/>
+              <a:gd name="connsiteX0" fmla="*/ 0 w 179251"/>
+              <a:gd name="connsiteY0" fmla="*/ 0 h 219075"/>
+              <a:gd name="connsiteX1" fmla="*/ 152400 w 179251"/>
+              <a:gd name="connsiteY1" fmla="*/ 28575 h 219075"/>
+              <a:gd name="connsiteX2" fmla="*/ 171450 w 179251"/>
+              <a:gd name="connsiteY2" fmla="*/ 142875 h 219075"/>
+              <a:gd name="connsiteX3" fmla="*/ 66675 w 179251"/>
+              <a:gd name="connsiteY3" fmla="*/ 219075 h 219075"/>
+              <a:gd name="connsiteX0" fmla="*/ 0 w 179251"/>
+              <a:gd name="connsiteY0" fmla="*/ 0 h 219075"/>
+              <a:gd name="connsiteX1" fmla="*/ 152400 w 179251"/>
+              <a:gd name="connsiteY1" fmla="*/ 28575 h 219075"/>
+              <a:gd name="connsiteX2" fmla="*/ 171450 w 179251"/>
+              <a:gd name="connsiteY2" fmla="*/ 142875 h 219075"/>
+              <a:gd name="connsiteX3" fmla="*/ 66675 w 179251"/>
+              <a:gd name="connsiteY3" fmla="*/ 219075 h 219075"/>
+              <a:gd name="connsiteX0" fmla="*/ 0 w 179251"/>
+              <a:gd name="connsiteY0" fmla="*/ 0 h 219075"/>
+              <a:gd name="connsiteX1" fmla="*/ 152400 w 179251"/>
+              <a:gd name="connsiteY1" fmla="*/ 28575 h 219075"/>
+              <a:gd name="connsiteX2" fmla="*/ 171450 w 179251"/>
+              <a:gd name="connsiteY2" fmla="*/ 142875 h 219075"/>
+              <a:gd name="connsiteX3" fmla="*/ 66675 w 179251"/>
+              <a:gd name="connsiteY3" fmla="*/ 219075 h 219075"/>
+              <a:gd name="connsiteX0" fmla="*/ 0 w 181063"/>
+              <a:gd name="connsiteY0" fmla="*/ 0 h 219075"/>
+              <a:gd name="connsiteX1" fmla="*/ 152400 w 181063"/>
+              <a:gd name="connsiteY1" fmla="*/ 28575 h 219075"/>
+              <a:gd name="connsiteX2" fmla="*/ 173831 w 181063"/>
+              <a:gd name="connsiteY2" fmla="*/ 147637 h 219075"/>
+              <a:gd name="connsiteX3" fmla="*/ 66675 w 181063"/>
+              <a:gd name="connsiteY3" fmla="*/ 219075 h 219075"/>
+              <a:gd name="connsiteX0" fmla="*/ 0 w 247250"/>
+              <a:gd name="connsiteY0" fmla="*/ 0 h 219075"/>
+              <a:gd name="connsiteX1" fmla="*/ 152400 w 247250"/>
+              <a:gd name="connsiteY1" fmla="*/ 28575 h 219075"/>
+              <a:gd name="connsiteX2" fmla="*/ 245269 w 247250"/>
+              <a:gd name="connsiteY2" fmla="*/ 161924 h 219075"/>
+              <a:gd name="connsiteX3" fmla="*/ 66675 w 247250"/>
+              <a:gd name="connsiteY3" fmla="*/ 219075 h 219075"/>
+              <a:gd name="connsiteX0" fmla="*/ 0 w 267747"/>
+              <a:gd name="connsiteY0" fmla="*/ 0 h 219075"/>
+              <a:gd name="connsiteX1" fmla="*/ 238125 w 267747"/>
+              <a:gd name="connsiteY1" fmla="*/ 28575 h 219075"/>
+              <a:gd name="connsiteX2" fmla="*/ 245269 w 267747"/>
+              <a:gd name="connsiteY2" fmla="*/ 161924 h 219075"/>
+              <a:gd name="connsiteX3" fmla="*/ 66675 w 267747"/>
+              <a:gd name="connsiteY3" fmla="*/ 219075 h 219075"/>
+              <a:gd name="connsiteX0" fmla="*/ 0 w 255113"/>
+              <a:gd name="connsiteY0" fmla="*/ 0 h 221457"/>
+              <a:gd name="connsiteX1" fmla="*/ 226219 w 255113"/>
+              <a:gd name="connsiteY1" fmla="*/ 30957 h 221457"/>
+              <a:gd name="connsiteX2" fmla="*/ 233363 w 255113"/>
+              <a:gd name="connsiteY2" fmla="*/ 164306 h 221457"/>
+              <a:gd name="connsiteX3" fmla="*/ 54769 w 255113"/>
+              <a:gd name="connsiteY3" fmla="*/ 221457 h 221457"/>
+            </a:gdLst>
+            <a:ahLst/>
+            <a:cxnLst>
+              <a:cxn ang="0">
+                <a:pos x="connsiteX0" y="connsiteY0"/>
+              </a:cxn>
+              <a:cxn ang="0">
+                <a:pos x="connsiteX1" y="connsiteY1"/>
+              </a:cxn>
+              <a:cxn ang="0">
+                <a:pos x="connsiteX2" y="connsiteY2"/>
+              </a:cxn>
+              <a:cxn ang="0">
+                <a:pos x="connsiteX3" y="connsiteY3"/>
+              </a:cxn>
+            </a:cxnLst>
+            <a:rect l="l" t="t" r="r" b="b"/>
+            <a:pathLst>
+              <a:path w="255113" h="221457">
+                <a:moveTo>
+                  <a:pt x="0" y="0"/>
+                </a:moveTo>
+                <a:cubicBezTo>
+                  <a:pt x="61912" y="2381"/>
+                  <a:pt x="187325" y="3573"/>
+                  <a:pt x="226219" y="30957"/>
+                </a:cubicBezTo>
+                <a:cubicBezTo>
+                  <a:pt x="265113" y="58341"/>
+                  <a:pt x="261938" y="132556"/>
+                  <a:pt x="233363" y="164306"/>
+                </a:cubicBezTo>
+                <a:cubicBezTo>
+                  <a:pt x="204788" y="196056"/>
+                  <a:pt x="106362" y="213520"/>
+                  <a:pt x="54769" y="221457"/>
+                </a:cubicBezTo>
+              </a:path>
+            </a:pathLst>
+          </a:custGeom>
+          <a:noFill/>
+          <a:ln w="19050">
+            <a:solidFill>
+              <a:srgbClr val="7030A0"/>
+            </a:solidFill>
+            <a:prstDash val="sysDash"/>
+            <a:headEnd type="arrow"/>
+            <a:tailEnd type="none"/>
+          </a:ln>
+        </p:spPr>
+        <p:style>
+          <a:lnRef idx="2">
+            <a:schemeClr val="accent1">
+              <a:shade val="50000"/>
+            </a:schemeClr>
+          </a:lnRef>
+          <a:fillRef idx="1">
+            <a:schemeClr val="accent1"/>
+          </a:fillRef>
+          <a:effectRef idx="0">
+            <a:schemeClr val="accent1"/>
+          </a:effectRef>
+          <a:fontRef idx="minor">
+            <a:schemeClr val="lt1"/>
+          </a:fontRef>
+        </p:style>
+        <p:txBody>
+          <a:bodyPr rtlCol="0" anchor="ctr"/>
+          <a:lstStyle/>
+          <a:p>
+            <a:pPr algn="ctr"/>
+            <a:endParaRPr lang="en-SG"/>
+          </a:p>
+        </p:txBody>
+      </p:sp>
+      <p:cxnSp>
+        <p:nvCxnSpPr>
+          <p:cNvPr id="52" name="Straight Arrow Connector 51"/>
+          <p:cNvCxnSpPr>
+            <a:cxnSpLocks/>
+          </p:cNvCxnSpPr>
+          <p:nvPr/>
+        </p:nvCxnSpPr>
+        <p:spPr>
+          <a:xfrm>
+            <a:off x="6946770" y="4369647"/>
+            <a:ext cx="2197230" cy="0"/>
+          </a:xfrm>
+          <a:prstGeom prst="straightConnector1">
+            <a:avLst/>
+          </a:prstGeom>
+          <a:ln w="19050">
+            <a:solidFill>
+              <a:srgbClr val="7030A0"/>
+            </a:solidFill>
+            <a:tailEnd type="arrow"/>
+          </a:ln>
+        </p:spPr>
+        <p:style>
+          <a:lnRef idx="1">
+            <a:schemeClr val="accent1"/>
+          </a:lnRef>
+          <a:fillRef idx="0">
+            <a:schemeClr val="accent1"/>
+          </a:fillRef>
+          <a:effectRef idx="0">
+            <a:schemeClr val="accent1"/>
+          </a:effectRef>
+          <a:fontRef idx="minor">
+            <a:schemeClr val="tx1"/>
+          </a:fontRef>
+        </p:style>
+      </p:cxnSp>
+      <p:sp>
+        <p:nvSpPr>
+          <p:cNvPr id="58" name="Snip Single Corner Rectangle 57"/>
+          <p:cNvSpPr/>
+          <p:nvPr/>
+        </p:nvSpPr>
+        <p:spPr>
+          <a:xfrm flipV="1">
+            <a:off x="5916079" y="3595922"/>
+            <a:ext cx="632695" cy="323484"/>
+          </a:xfrm>
+          <a:prstGeom prst="snip1Rect">
+            <a:avLst>
+              <a:gd name="adj" fmla="val 29067"/>
+            </a:avLst>
+          </a:prstGeom>
+          <a:solidFill>
+            <a:schemeClr val="bg1"/>
+          </a:solidFill>
+          <a:ln w="28575">
+            <a:solidFill>
+              <a:schemeClr val="tx1"/>
+            </a:solidFill>
+          </a:ln>
+        </p:spPr>
+        <p:style>
+          <a:lnRef idx="2">
+            <a:schemeClr val="accent1">
+              <a:shade val="50000"/>
+            </a:schemeClr>
+          </a:lnRef>
+          <a:fillRef idx="1">
+            <a:schemeClr val="accent1"/>
+          </a:fillRef>
+          <a:effectRef idx="0">
+            <a:schemeClr val="accent1"/>
+          </a:effectRef>
+          <a:fontRef idx="minor">
+            <a:schemeClr val="lt1"/>
+          </a:fontRef>
+        </p:style>
+        <p:txBody>
+          <a:bodyPr rtlCol="0" anchor="ctr"/>
+          <a:lstStyle/>
+          <a:p>
+            <a:pPr algn="ctr"/>
+            <a:endParaRPr lang="en-SG" dirty="0"/>
+          </a:p>
+        </p:txBody>
+      </p:sp>
+      <p:sp>
+        <p:nvSpPr>
+          <p:cNvPr id="59" name="TextBox 58"/>
+          <p:cNvSpPr txBox="1"/>
+          <p:nvPr/>
+        </p:nvSpPr>
+        <p:spPr>
+          <a:xfrm>
+            <a:off x="6068415" y="3651660"/>
+            <a:ext cx="2918192" cy="215444"/>
+          </a:xfrm>
+          <a:prstGeom prst="rect">
+            <a:avLst/>
+          </a:prstGeom>
+          <a:noFill/>
+        </p:spPr>
+        <p:txBody>
+          <a:bodyPr wrap="square" lIns="0" tIns="0" rIns="0" bIns="0" rtlCol="0">
+            <a:spAutoFit/>
+          </a:bodyPr>
+          <a:lstStyle>
+            <a:defPPr>
+              <a:defRPr lang="en-US"/>
+            </a:defPPr>
+            <a:lvl1pPr algn="r">
+              <a:defRPr sz="1400">
+                <a:solidFill>
+                  <a:srgbClr val="0070C0"/>
+                </a:solidFill>
+              </a:defRPr>
+            </a:lvl1pPr>
+          </a:lstStyle>
+          <a:p>
+            <a:pPr algn="l"/>
+            <a:r>
+              <a:rPr lang="en-US" dirty="0" smtClean="0">
+                <a:solidFill>
+                  <a:schemeClr val="tx1"/>
+                </a:solidFill>
+              </a:rPr>
+              <a:t>loop      </a:t>
+            </a:r>
+            <a:r>
+              <a:rPr lang="en-US" dirty="0" smtClean="0">
+                <a:solidFill>
+                  <a:schemeClr val="tx1"/>
+                </a:solidFill>
+                <a:effectLst>
+                  <a:glow rad="127000">
+                    <a:schemeClr val="accent4">
+                      <a:lumMod val="20000"/>
+                      <a:lumOff val="80000"/>
+                    </a:schemeClr>
+                  </a:glow>
+                </a:effectLst>
+              </a:rPr>
+              <a:t>[until end of test phrase]</a:t>
+            </a:r>
+            <a:endParaRPr lang="en-US" dirty="0">
+              <a:solidFill>
+                <a:schemeClr val="tx1"/>
+              </a:solidFill>
+              <a:effectLst>
+                <a:glow rad="127000">
+                  <a:schemeClr val="accent4">
+                    <a:lumMod val="20000"/>
+                    <a:lumOff val="80000"/>
+                  </a:schemeClr>
+                </a:glow>
+              </a:effectLst>
+            </a:endParaRPr>
+          </a:p>
+        </p:txBody>
+      </p:sp>
+      <p:sp>
+        <p:nvSpPr>
+          <p:cNvPr id="60" name="TextBox 59"/>
+          <p:cNvSpPr txBox="1"/>
+          <p:nvPr/>
+        </p:nvSpPr>
+        <p:spPr>
+          <a:xfrm>
+            <a:off x="7106672" y="2743785"/>
+            <a:ext cx="1673258" cy="646331"/>
+          </a:xfrm>
+          <a:prstGeom prst="rect">
+            <a:avLst/>
+          </a:prstGeom>
+          <a:noFill/>
+        </p:spPr>
+        <p:txBody>
+          <a:bodyPr wrap="square" lIns="0" tIns="0" rIns="0" bIns="0" rtlCol="0">
+            <a:spAutoFit/>
+          </a:bodyPr>
+          <a:lstStyle>
+            <a:defPPr>
+              <a:defRPr lang="en-US"/>
+            </a:defPPr>
+            <a:lvl1pPr algn="r">
+              <a:defRPr sz="1400">
+                <a:solidFill>
+                  <a:srgbClr val="0070C0"/>
+                </a:solidFill>
+              </a:defRPr>
+            </a:lvl1pPr>
+          </a:lstStyle>
+          <a:p>
+            <a:pPr algn="ctr"/>
+            <a:r>
+              <a:rPr lang="en-US" dirty="0" smtClean="0">
+                <a:solidFill>
+                  <a:srgbClr val="7030A0"/>
+                </a:solidFill>
+              </a:rPr>
+              <a:t>&lt;&lt;static&gt;&gt;</a:t>
+            </a:r>
+            <a:br>
+              <a:rPr lang="en-US" dirty="0" smtClean="0">
+                <a:solidFill>
+                  <a:srgbClr val="7030A0"/>
+                </a:solidFill>
+              </a:rPr>
+            </a:br>
+            <a:r>
+              <a:rPr lang="en-US" dirty="0" err="1" smtClean="0">
+                <a:solidFill>
+                  <a:srgbClr val="7030A0"/>
+                </a:solidFill>
+              </a:rPr>
+              <a:t>parseTestPhrase</a:t>
+            </a:r>
+            <a:r>
+              <a:rPr lang="en-US" dirty="0" smtClean="0">
+                <a:solidFill>
+                  <a:srgbClr val="7030A0"/>
+                </a:solidFill>
+              </a:rPr>
+              <a:t>(</a:t>
+            </a:r>
+            <a:r>
+              <a:rPr lang="en-US" dirty="0" err="1" smtClean="0">
+                <a:solidFill>
+                  <a:srgbClr val="7030A0"/>
+                </a:solidFill>
+              </a:rPr>
+              <a:t>clazz</a:t>
+            </a:r>
+            <a:r>
+              <a:rPr lang="en-US" dirty="0" smtClean="0">
+                <a:solidFill>
+                  <a:srgbClr val="7030A0"/>
+                </a:solidFill>
+              </a:rPr>
+              <a:t>, </a:t>
+            </a:r>
+            <a:r>
+              <a:rPr lang="en-US" dirty="0" err="1" smtClean="0">
+                <a:solidFill>
+                  <a:srgbClr val="7030A0"/>
+                </a:solidFill>
+              </a:rPr>
+              <a:t>filterOp</a:t>
+            </a:r>
+            <a:r>
+              <a:rPr lang="en-US" dirty="0" smtClean="0">
+                <a:solidFill>
+                  <a:srgbClr val="7030A0"/>
+                </a:solidFill>
+              </a:rPr>
+              <a:t>, </a:t>
+            </a:r>
+            <a:r>
+              <a:rPr lang="en-US" dirty="0" err="1" smtClean="0">
+                <a:solidFill>
+                  <a:srgbClr val="7030A0"/>
+                </a:solidFill>
+              </a:rPr>
+              <a:t>testPhrase</a:t>
+            </a:r>
+            <a:r>
+              <a:rPr lang="en-US" dirty="0" smtClean="0">
+                <a:solidFill>
+                  <a:srgbClr val="7030A0"/>
+                </a:solidFill>
+              </a:rPr>
+              <a:t>)</a:t>
+            </a:r>
+            <a:endParaRPr lang="en-US" dirty="0">
+              <a:solidFill>
+                <a:srgbClr val="7030A0"/>
+              </a:solidFill>
+            </a:endParaRPr>
+          </a:p>
+        </p:txBody>
+      </p:sp>
+      <p:sp>
+        <p:nvSpPr>
+          <p:cNvPr id="65" name="TextBox 64"/>
+          <p:cNvSpPr txBox="1"/>
+          <p:nvPr/>
+        </p:nvSpPr>
+        <p:spPr>
+          <a:xfrm>
+            <a:off x="7049542" y="3938760"/>
+            <a:ext cx="1979133" cy="430887"/>
+          </a:xfrm>
+          <a:prstGeom prst="rect">
+            <a:avLst/>
+          </a:prstGeom>
+          <a:noFill/>
+        </p:spPr>
+        <p:txBody>
+          <a:bodyPr wrap="square" lIns="0" tIns="0" rIns="0" bIns="0" rtlCol="0">
+            <a:spAutoFit/>
+          </a:bodyPr>
+          <a:lstStyle>
+            <a:defPPr>
+              <a:defRPr lang="en-US"/>
+            </a:defPPr>
+            <a:lvl1pPr algn="r">
+              <a:defRPr sz="1400">
+                <a:solidFill>
+                  <a:srgbClr val="0070C0"/>
+                </a:solidFill>
+              </a:defRPr>
+            </a:lvl1pPr>
+          </a:lstStyle>
+          <a:p>
+            <a:pPr algn="ctr"/>
+            <a:r>
+              <a:rPr lang="en-US" dirty="0" smtClean="0">
+                <a:solidFill>
+                  <a:srgbClr val="7030A0"/>
+                </a:solidFill>
+              </a:rPr>
+              <a:t>&lt;&lt;static&gt;&gt;</a:t>
+            </a:r>
+          </a:p>
+          <a:p>
+            <a:pPr algn="ctr"/>
+            <a:r>
+              <a:rPr lang="en-US" dirty="0" err="1" smtClean="0">
+                <a:solidFill>
+                  <a:srgbClr val="7030A0"/>
+                </a:solidFill>
+              </a:rPr>
+              <a:t>makeFilter</a:t>
+            </a:r>
+            <a:r>
+              <a:rPr lang="en-US" dirty="0" smtClean="0">
+                <a:solidFill>
+                  <a:srgbClr val="7030A0"/>
+                </a:solidFill>
+              </a:rPr>
+              <a:t>(</a:t>
+            </a:r>
+            <a:r>
+              <a:rPr lang="en-US" dirty="0" err="1" smtClean="0">
+                <a:solidFill>
+                  <a:srgbClr val="7030A0"/>
+                </a:solidFill>
+              </a:rPr>
+              <a:t>filterOp</a:t>
+            </a:r>
+            <a:r>
+              <a:rPr lang="en-US" dirty="0" smtClean="0">
+                <a:solidFill>
+                  <a:srgbClr val="7030A0"/>
+                </a:solidFill>
+              </a:rPr>
+              <a:t>, token)</a:t>
+            </a:r>
+            <a:endParaRPr lang="en-US" dirty="0">
+              <a:solidFill>
+                <a:srgbClr val="7030A0"/>
+              </a:solidFill>
+            </a:endParaRPr>
+          </a:p>
+        </p:txBody>
+      </p:sp>
+      <p:cxnSp>
+        <p:nvCxnSpPr>
+          <p:cNvPr id="69" name="Straight Arrow Connector 68">
+            <a:extLst>
+              <a:ext uri="{FF2B5EF4-FFF2-40B4-BE49-F238E27FC236}">
+                <a16:creationId xmlns:a16="http://schemas.microsoft.com/office/drawing/2014/main" id="{7C9F21BC-13A9-471F-825A-2621FD36355F}"/>
+              </a:ext>
+            </a:extLst>
+          </p:cNvPr>
+          <p:cNvCxnSpPr>
+            <a:cxnSpLocks/>
+          </p:cNvCxnSpPr>
+          <p:nvPr/>
+        </p:nvCxnSpPr>
+        <p:spPr>
+          <a:xfrm>
+            <a:off x="6946770" y="4760262"/>
+            <a:ext cx="2194925" cy="0"/>
+          </a:xfrm>
+          <a:prstGeom prst="straightConnector1">
+            <a:avLst/>
+          </a:prstGeom>
+          <a:ln w="19050">
+            <a:solidFill>
+              <a:srgbClr val="7030A0"/>
+            </a:solidFill>
+            <a:prstDash val="sysDash"/>
+            <a:headEnd type="arrow" w="med" len="med"/>
+            <a:tailEnd type="none" w="med" len="med"/>
+          </a:ln>
+        </p:spPr>
+        <p:style>
+          <a:lnRef idx="1">
+            <a:schemeClr val="accent1"/>
+          </a:lnRef>
+          <a:fillRef idx="0">
+            <a:schemeClr val="accent1"/>
+          </a:fillRef>
+          <a:effectRef idx="0">
+            <a:schemeClr val="accent1"/>
+          </a:effectRef>
+          <a:fontRef idx="minor">
+            <a:schemeClr val="tx1"/>
+          </a:fontRef>
+        </p:style>
+      </p:cxnSp>
+      <p:sp>
+        <p:nvSpPr>
+          <p:cNvPr id="70" name="TextBox 69"/>
+          <p:cNvSpPr txBox="1"/>
+          <p:nvPr/>
+        </p:nvSpPr>
+        <p:spPr>
+          <a:xfrm>
+            <a:off x="7697147" y="4526128"/>
+            <a:ext cx="738788" cy="215444"/>
+          </a:xfrm>
+          <a:prstGeom prst="rect">
+            <a:avLst/>
+          </a:prstGeom>
+          <a:noFill/>
+        </p:spPr>
+        <p:txBody>
+          <a:bodyPr wrap="square" lIns="0" tIns="0" rIns="0" bIns="0" rtlCol="0">
+            <a:spAutoFit/>
+          </a:bodyPr>
+          <a:lstStyle>
+            <a:defPPr>
+              <a:defRPr lang="en-US"/>
+            </a:defPPr>
+            <a:lvl1pPr algn="r">
+              <a:defRPr sz="1400">
+                <a:solidFill>
+                  <a:srgbClr val="0070C0"/>
+                </a:solidFill>
+              </a:defRPr>
+            </a:lvl1pPr>
+          </a:lstStyle>
+          <a:p>
+            <a:r>
+              <a:rPr lang="en-US" dirty="0" smtClean="0">
+                <a:solidFill>
+                  <a:srgbClr val="7030A0"/>
+                </a:solidFill>
+              </a:rPr>
+              <a:t>predicate</a:t>
+            </a:r>
+            <a:endParaRPr lang="en-US" dirty="0">
+              <a:solidFill>
+                <a:srgbClr val="7030A0"/>
+              </a:solidFill>
             </a:endParaRPr>
           </a:p>
         </p:txBody>
@@ -5110,7 +7825,7 @@
     </p:spTree>
     <p:extLst>
       <p:ext uri="{BB962C8B-B14F-4D97-AF65-F5344CB8AC3E}">
-        <p14:creationId xmlns:p14="http://schemas.microsoft.com/office/powerpoint/2010/main" val="3945898909"/>
+        <p14:creationId xmlns:p14="http://schemas.microsoft.com/office/powerpoint/2010/main" val="1017759473"/>
       </p:ext>
     </p:extLst>
   </p:cSld>

</xml_diff>

<commit_message>
Update some diagrams for filter
</commit_message>
<xml_diff>
--- a/docs/diagrams/FilterOperationSequenceDiagram.pptx
+++ b/docs/diagrams/FilterOperationSequenceDiagram.pptx
@@ -127,10 +127,6 @@
 </p:presentation>
 </file>
 
-<file path=ppt/revisionInfo.xml><?xml version="1.0" encoding="utf-8"?>
-<p1510:revInfo xmlns:a="http://schemas.openxmlformats.org/drawingml/2006/main" xmlns:r="http://schemas.openxmlformats.org/officeDocument/2006/relationships" xmlns:p1510="http://schemas.microsoft.com/office/powerpoint/2015/10/main"/>
-</file>
-
 <file path=ppt/notesMasters/notesMaster1.xml><?xml version="1.0" encoding="utf-8"?>
 <p:notesMaster xmlns:a="http://schemas.openxmlformats.org/drawingml/2006/main" xmlns:r="http://schemas.openxmlformats.org/officeDocument/2006/relationships" xmlns:p="http://schemas.openxmlformats.org/presentationml/2006/main">
   <p:cSld>
@@ -213,7 +209,7 @@
           <a:p>
             <a:fld id="{F5CC4B3F-88C1-4FFA-B1B6-F41C21DC6924}" type="datetimeFigureOut">
               <a:rPr lang="en-US" smtClean="0"/>
-              <a:t>11/6/2018</a:t>
+              <a:t>11/12/2018</a:t>
             </a:fld>
             <a:endParaRPr lang="en-US"/>
           </a:p>
@@ -659,7 +655,7 @@
           <a:p>
             <a:fld id="{78C97017-6FC3-485B-9764-EAC9E56C1D49}" type="datetimeFigureOut">
               <a:rPr lang="en-US" smtClean="0"/>
-              <a:t>11/6/2018</a:t>
+              <a:t>11/12/2018</a:t>
             </a:fld>
             <a:endParaRPr lang="en-US"/>
           </a:p>
@@ -827,7 +823,7 @@
           <a:p>
             <a:fld id="{78C97017-6FC3-485B-9764-EAC9E56C1D49}" type="datetimeFigureOut">
               <a:rPr lang="en-US" smtClean="0"/>
-              <a:t>11/6/2018</a:t>
+              <a:t>11/12/2018</a:t>
             </a:fld>
             <a:endParaRPr lang="en-US"/>
           </a:p>
@@ -1005,7 +1001,7 @@
           <a:p>
             <a:fld id="{78C97017-6FC3-485B-9764-EAC9E56C1D49}" type="datetimeFigureOut">
               <a:rPr lang="en-US" smtClean="0"/>
-              <a:t>11/6/2018</a:t>
+              <a:t>11/12/2018</a:t>
             </a:fld>
             <a:endParaRPr lang="en-US"/>
           </a:p>
@@ -1173,7 +1169,7 @@
           <a:p>
             <a:fld id="{78C97017-6FC3-485B-9764-EAC9E56C1D49}" type="datetimeFigureOut">
               <a:rPr lang="en-US" smtClean="0"/>
-              <a:t>11/6/2018</a:t>
+              <a:t>11/12/2018</a:t>
             </a:fld>
             <a:endParaRPr lang="en-US"/>
           </a:p>
@@ -1418,7 +1414,7 @@
           <a:p>
             <a:fld id="{78C97017-6FC3-485B-9764-EAC9E56C1D49}" type="datetimeFigureOut">
               <a:rPr lang="en-US" smtClean="0"/>
-              <a:t>11/6/2018</a:t>
+              <a:t>11/12/2018</a:t>
             </a:fld>
             <a:endParaRPr lang="en-US"/>
           </a:p>
@@ -1703,7 +1699,7 @@
           <a:p>
             <a:fld id="{78C97017-6FC3-485B-9764-EAC9E56C1D49}" type="datetimeFigureOut">
               <a:rPr lang="en-US" smtClean="0"/>
-              <a:t>11/6/2018</a:t>
+              <a:t>11/12/2018</a:t>
             </a:fld>
             <a:endParaRPr lang="en-US"/>
           </a:p>
@@ -2122,7 +2118,7 @@
           <a:p>
             <a:fld id="{78C97017-6FC3-485B-9764-EAC9E56C1D49}" type="datetimeFigureOut">
               <a:rPr lang="en-US" smtClean="0"/>
-              <a:t>11/6/2018</a:t>
+              <a:t>11/12/2018</a:t>
             </a:fld>
             <a:endParaRPr lang="en-US"/>
           </a:p>
@@ -2239,7 +2235,7 @@
           <a:p>
             <a:fld id="{78C97017-6FC3-485B-9764-EAC9E56C1D49}" type="datetimeFigureOut">
               <a:rPr lang="en-US" smtClean="0"/>
-              <a:t>11/6/2018</a:t>
+              <a:t>11/12/2018</a:t>
             </a:fld>
             <a:endParaRPr lang="en-US"/>
           </a:p>
@@ -2334,7 +2330,7 @@
           <a:p>
             <a:fld id="{78C97017-6FC3-485B-9764-EAC9E56C1D49}" type="datetimeFigureOut">
               <a:rPr lang="en-US" smtClean="0"/>
-              <a:t>11/6/2018</a:t>
+              <a:t>11/12/2018</a:t>
             </a:fld>
             <a:endParaRPr lang="en-US"/>
           </a:p>
@@ -2609,7 +2605,7 @@
           <a:p>
             <a:fld id="{78C97017-6FC3-485B-9764-EAC9E56C1D49}" type="datetimeFigureOut">
               <a:rPr lang="en-US" smtClean="0"/>
-              <a:t>11/6/2018</a:t>
+              <a:t>11/12/2018</a:t>
             </a:fld>
             <a:endParaRPr lang="en-US"/>
           </a:p>
@@ -2861,7 +2857,7 @@
           <a:p>
             <a:fld id="{78C97017-6FC3-485B-9764-EAC9E56C1D49}" type="datetimeFigureOut">
               <a:rPr lang="en-US" smtClean="0"/>
-              <a:t>11/6/2018</a:t>
+              <a:t>11/12/2018</a:t>
             </a:fld>
             <a:endParaRPr lang="en-US"/>
           </a:p>
@@ -3072,7 +3068,7 @@
           <a:p>
             <a:fld id="{78C97017-6FC3-485B-9764-EAC9E56C1D49}" type="datetimeFigureOut">
               <a:rPr lang="en-US" smtClean="0"/>
-              <a:t>11/6/2018</a:t>
+              <a:t>11/12/2018</a:t>
             </a:fld>
             <a:endParaRPr lang="en-US"/>
           </a:p>
@@ -3659,7 +3655,7 @@
           <a:p>
             <a:pPr algn="ctr"/>
             <a:r>
-              <a:rPr lang="en-US" sz="1500" dirty="0" smtClean="0">
+              <a:rPr lang="en-US" sz="1500" dirty="0">
                 <a:solidFill>
                   <a:schemeClr val="bg1"/>
                 </a:solidFill>
@@ -3667,7 +3663,7 @@
               <a:t>:</a:t>
             </a:r>
             <a:r>
-              <a:rPr lang="en-US" sz="1500" dirty="0" err="1" smtClean="0">
+              <a:rPr lang="en-US" sz="1500" dirty="0" err="1">
                 <a:solidFill>
                   <a:schemeClr val="bg1"/>
                 </a:solidFill>
@@ -3869,18 +3865,13 @@
           <a:p>
             <a:pPr algn="r"/>
             <a:r>
-              <a:rPr lang="en-US" sz="1400" dirty="0" smtClean="0">
+              <a:rPr lang="en-US" sz="1400" dirty="0">
                 <a:solidFill>
                   <a:srgbClr val="0070C0"/>
                 </a:solidFill>
               </a:rPr>
               <a:t>parse()</a:t>
             </a:r>
-            <a:endParaRPr lang="en-US" sz="1400" dirty="0">
-              <a:solidFill>
-                <a:srgbClr val="0070C0"/>
-              </a:solidFill>
-            </a:endParaRPr>
           </a:p>
         </p:txBody>
       </p:sp>
@@ -3918,10 +3909,9 @@
           </a:lstStyle>
           <a:p>
             <a:r>
-              <a:rPr lang="en-US" dirty="0" smtClean="0"/>
+              <a:rPr lang="en-US" dirty="0"/>
               <a:t>parse(expression)</a:t>
             </a:r>
-            <a:endParaRPr lang="en-US" dirty="0"/>
           </a:p>
         </p:txBody>
       </p:sp>
@@ -4037,18 +4027,13 @@
           </a:lstStyle>
           <a:p>
             <a:r>
-              <a:rPr lang="en-US" dirty="0" smtClean="0">
+              <a:rPr lang="en-US" dirty="0">
                 <a:solidFill>
                   <a:srgbClr val="7030A0"/>
                 </a:solidFill>
               </a:rPr>
               <a:t>predicate</a:t>
             </a:r>
-            <a:endParaRPr lang="en-US" dirty="0">
-              <a:solidFill>
-                <a:srgbClr val="7030A0"/>
-              </a:solidFill>
-            </a:endParaRPr>
           </a:p>
         </p:txBody>
       </p:sp>
@@ -4086,7 +4071,7 @@
           </a:lstStyle>
           <a:p>
             <a:r>
-              <a:rPr lang="en-US" dirty="0" err="1" smtClean="0"/>
+              <a:rPr lang="en-US" dirty="0" err="1"/>
               <a:t>filterCommand</a:t>
             </a:r>
             <a:endParaRPr lang="en-US" dirty="0"/>
@@ -4137,7 +4122,7 @@
           <a:p>
             <a:pPr algn="ctr"/>
             <a:r>
-              <a:rPr lang="en-US" sz="1600" dirty="0" smtClean="0">
+              <a:rPr lang="en-US" sz="1600" dirty="0">
                 <a:solidFill>
                   <a:schemeClr val="bg1"/>
                 </a:solidFill>
@@ -4525,10 +4510,9 @@
           </a:lstStyle>
           <a:p>
             <a:r>
-              <a:rPr lang="en-US" dirty="0" smtClean="0"/>
+              <a:rPr lang="en-US" dirty="0"/>
               <a:t>&lt;lambda&gt;.parse(tokenizer)</a:t>
             </a:r>
-            <a:endParaRPr lang="en-US" dirty="0"/>
           </a:p>
         </p:txBody>
       </p:sp>
@@ -4621,29 +4605,28 @@
           <a:p>
             <a:pPr algn="ctr"/>
             <a:r>
-              <a:rPr lang="en-US" dirty="0" smtClean="0"/>
+              <a:rPr lang="en-US" dirty="0"/>
               <a:t>&lt;&lt;static&gt;&gt;</a:t>
             </a:r>
           </a:p>
           <a:p>
             <a:pPr algn="ctr"/>
             <a:r>
-              <a:rPr lang="en-US" dirty="0" err="1" smtClean="0"/>
+              <a:rPr lang="en-US" dirty="0" err="1"/>
               <a:t>makeFilter</a:t>
             </a:r>
             <a:r>
-              <a:rPr lang="en-US" dirty="0" smtClean="0"/>
+              <a:rPr lang="en-US" dirty="0"/>
               <a:t>(op, </a:t>
             </a:r>
             <a:r>
-              <a:rPr lang="en-US" dirty="0" err="1" smtClean="0"/>
+              <a:rPr lang="en-US" dirty="0" err="1"/>
               <a:t>testPhrase</a:t>
             </a:r>
             <a:r>
-              <a:rPr lang="en-US" dirty="0" smtClean="0"/>
+              <a:rPr lang="en-US" dirty="0"/>
               <a:t>)</a:t>
             </a:r>
-            <a:endParaRPr lang="en-US" dirty="0"/>
           </a:p>
         </p:txBody>
       </p:sp>
@@ -4681,10 +4664,9 @@
           </a:lstStyle>
           <a:p>
             <a:r>
-              <a:rPr lang="en-US" dirty="0" smtClean="0"/>
+              <a:rPr lang="en-US" dirty="0"/>
               <a:t>predicate</a:t>
             </a:r>
-            <a:endParaRPr lang="en-US" dirty="0"/>
           </a:p>
         </p:txBody>
       </p:sp>
@@ -4807,7 +4789,7 @@
           </a:lstStyle>
           <a:p>
             <a:r>
-              <a:rPr lang="en-US" dirty="0" err="1" smtClean="0"/>
+              <a:rPr lang="en-US" dirty="0" err="1"/>
               <a:t>composedPredicate</a:t>
             </a:r>
             <a:endParaRPr lang="en-US" dirty="0"/>
@@ -4899,7 +4881,7 @@
           <a:p>
             <a:pPr algn="l"/>
             <a:r>
-              <a:rPr lang="en-US" dirty="0" smtClean="0">
+              <a:rPr lang="en-US" dirty="0">
                 <a:solidFill>
                   <a:schemeClr val="tx1"/>
                 </a:solidFill>
@@ -4907,7 +4889,7 @@
               <a:t>loop      </a:t>
             </a:r>
             <a:r>
-              <a:rPr lang="en-US" dirty="0" smtClean="0">
+              <a:rPr lang="en-US" dirty="0">
                 <a:solidFill>
                   <a:schemeClr val="tx1"/>
                 </a:solidFill>
@@ -4922,19 +4904,6 @@
               </a:rPr>
               <a:t>[until end of filter expression]</a:t>
             </a:r>
-            <a:endParaRPr lang="en-US" dirty="0">
-              <a:solidFill>
-                <a:schemeClr val="tx1"/>
-              </a:solidFill>
-              <a:effectLst>
-                <a:glow rad="127000">
-                  <a:schemeClr val="accent1">
-                    <a:lumMod val="20000"/>
-                    <a:lumOff val="80000"/>
-                  </a:schemeClr>
-                </a:glow>
-              </a:effectLst>
-            </a:endParaRPr>
           </a:p>
         </p:txBody>
       </p:sp>
@@ -4982,20 +4951,12 @@
           <a:p>
             <a:pPr algn="ctr"/>
             <a:r>
-              <a:rPr lang="en-US" sz="1500" dirty="0" smtClean="0">
+              <a:rPr lang="en-US" sz="1500" dirty="0">
                 <a:solidFill>
                   <a:schemeClr val="bg1"/>
                 </a:solidFill>
               </a:rPr>
-              <a:t>:</a:t>
-            </a:r>
-            <a:r>
-              <a:rPr lang="en-US" sz="1500" dirty="0" smtClean="0">
-                <a:solidFill>
-                  <a:schemeClr val="bg1"/>
-                </a:solidFill>
-              </a:rPr>
-              <a:t>BooleanExpressionParser&lt;Task&gt;</a:t>
+              <a:t>:BooleanExpressionParser&lt;Task&gt;</a:t>
             </a:r>
             <a:endParaRPr lang="en-SG" sz="1500" dirty="0">
               <a:solidFill>
@@ -5139,8 +5100,8 @@
         </p:nvSpPr>
         <p:spPr>
           <a:xfrm>
-            <a:off x="5792626" y="163019"/>
-            <a:ext cx="4165731" cy="6694981"/>
+            <a:off x="5792626" y="71577"/>
+            <a:ext cx="4165731" cy="6938816"/>
           </a:xfrm>
           <a:prstGeom prst="roundRect">
             <a:avLst>
@@ -5200,7 +5161,7 @@
         </p:nvSpPr>
         <p:spPr>
           <a:xfrm>
-            <a:off x="5915811" y="3595923"/>
+            <a:off x="5915811" y="3747738"/>
             <a:ext cx="3609189" cy="1315686"/>
           </a:xfrm>
           <a:prstGeom prst="rect">
@@ -5246,12 +5207,12 @@
         </p:nvSpPr>
         <p:spPr>
           <a:xfrm>
-            <a:off x="331665" y="163018"/>
-            <a:ext cx="5330391" cy="6694982"/>
+            <a:off x="331665" y="71577"/>
+            <a:ext cx="5330391" cy="6938816"/>
           </a:xfrm>
           <a:prstGeom prst="roundRect">
             <a:avLst>
-              <a:gd name="adj" fmla="val 4152"/>
+              <a:gd name="adj" fmla="val 7774"/>
             </a:avLst>
           </a:prstGeom>
           <a:solidFill>
@@ -5307,8 +5268,8 @@
         </p:nvSpPr>
         <p:spPr>
           <a:xfrm>
-            <a:off x="636465" y="2317400"/>
-            <a:ext cx="9078021" cy="3576510"/>
+            <a:off x="636465" y="2317399"/>
+            <a:ext cx="9078021" cy="3804437"/>
           </a:xfrm>
           <a:prstGeom prst="rect">
             <a:avLst/>
@@ -5389,7 +5350,7 @@
           <a:p>
             <a:pPr algn="ctr"/>
             <a:r>
-              <a:rPr lang="en-US" sz="1500" dirty="0" smtClean="0">
+              <a:rPr lang="en-US" sz="1500" dirty="0">
                 <a:solidFill>
                   <a:schemeClr val="bg1"/>
                 </a:solidFill>
@@ -5397,7 +5358,7 @@
               <a:t>:</a:t>
             </a:r>
             <a:r>
-              <a:rPr lang="en-US" sz="1500" dirty="0" err="1" smtClean="0">
+              <a:rPr lang="en-US" sz="1500" dirty="0" err="1">
                 <a:solidFill>
                   <a:schemeClr val="bg1"/>
                 </a:solidFill>
@@ -5423,7 +5384,7 @@
         <p:spPr>
           <a:xfrm>
             <a:off x="1610959" y="888284"/>
-            <a:ext cx="0" cy="5893516"/>
+            <a:ext cx="0" cy="5969716"/>
           </a:xfrm>
           <a:prstGeom prst="line">
             <a:avLst/>
@@ -5460,7 +5421,7 @@
         <p:spPr>
           <a:xfrm>
             <a:off x="1538951" y="1193083"/>
-            <a:ext cx="152400" cy="5340731"/>
+            <a:ext cx="152400" cy="5492535"/>
           </a:xfrm>
           <a:prstGeom prst="rect">
             <a:avLst/>
@@ -5542,20 +5503,12 @@
           <a:p>
             <a:pPr algn="ctr"/>
             <a:r>
-              <a:rPr lang="en-US" sz="1500" dirty="0" smtClean="0">
+              <a:rPr lang="en-US" sz="1500" dirty="0">
                 <a:solidFill>
                   <a:schemeClr val="bg1"/>
                 </a:solidFill>
               </a:rPr>
-              <a:t>:</a:t>
-            </a:r>
-            <a:r>
-              <a:rPr lang="en-US" sz="1500" dirty="0" smtClean="0">
-                <a:solidFill>
-                  <a:schemeClr val="bg1"/>
-                </a:solidFill>
-              </a:rPr>
-              <a:t>BooleanExpressionParser&lt;Task&gt;</a:t>
+              <a:t>:BooleanExpressionParser&lt;Task&gt;</a:t>
             </a:r>
             <a:endParaRPr lang="en-SG" sz="1500" dirty="0">
               <a:solidFill>
@@ -5578,7 +5531,7 @@
         <p:spPr>
           <a:xfrm flipH="1">
             <a:off x="4113568" y="1536015"/>
-            <a:ext cx="17386" cy="4907975"/>
+            <a:ext cx="17386" cy="5167781"/>
           </a:xfrm>
           <a:prstGeom prst="line">
             <a:avLst/>
@@ -5717,18 +5670,13 @@
           <a:p>
             <a:pPr algn="r"/>
             <a:r>
-              <a:rPr lang="en-US" sz="1400" dirty="0" smtClean="0">
+              <a:rPr lang="en-US" sz="1400" dirty="0">
                 <a:solidFill>
                   <a:srgbClr val="0070C0"/>
                 </a:solidFill>
               </a:rPr>
               <a:t>parse()</a:t>
             </a:r>
-            <a:endParaRPr lang="en-US" sz="1400" dirty="0">
-              <a:solidFill>
-                <a:srgbClr val="0070C0"/>
-              </a:solidFill>
-            </a:endParaRPr>
           </a:p>
         </p:txBody>
       </p:sp>
@@ -5766,10 +5714,9 @@
           </a:lstStyle>
           <a:p>
             <a:r>
-              <a:rPr lang="en-US" dirty="0" smtClean="0"/>
+              <a:rPr lang="en-US" dirty="0"/>
               <a:t>parse(expression)</a:t>
             </a:r>
-            <a:endParaRPr lang="en-US" dirty="0"/>
           </a:p>
         </p:txBody>
       </p:sp>
@@ -5821,7 +5768,7 @@
         </p:nvCxnSpPr>
         <p:spPr>
           <a:xfrm>
-            <a:off x="218580" y="6533815"/>
+            <a:off x="218580" y="6685630"/>
             <a:ext cx="1310696" cy="0"/>
           </a:xfrm>
           <a:prstGeom prst="straightConnector1">
@@ -5859,7 +5806,7 @@
         </p:nvSpPr>
         <p:spPr>
           <a:xfrm>
-            <a:off x="4546865" y="5201592"/>
+            <a:off x="4546865" y="5353407"/>
             <a:ext cx="969760" cy="215444"/>
           </a:xfrm>
           <a:prstGeom prst="rect">
@@ -5885,7 +5832,7 @@
           </a:lstStyle>
           <a:p>
             <a:r>
-              <a:rPr lang="en-US" dirty="0" err="1" smtClean="0">
+              <a:rPr lang="en-US" dirty="0" err="1">
                 <a:solidFill>
                   <a:srgbClr val="7030A0"/>
                 </a:solidFill>
@@ -5908,7 +5855,7 @@
         </p:nvSpPr>
         <p:spPr>
           <a:xfrm>
-            <a:off x="218580" y="6318371"/>
+            <a:off x="218580" y="6470186"/>
             <a:ext cx="1283296" cy="215444"/>
           </a:xfrm>
           <a:prstGeom prst="rect">
@@ -5934,7 +5881,7 @@
           </a:lstStyle>
           <a:p>
             <a:r>
-              <a:rPr lang="en-US" dirty="0" err="1" smtClean="0"/>
+              <a:rPr lang="en-US" dirty="0" err="1"/>
               <a:t>filterCommand</a:t>
             </a:r>
             <a:endParaRPr lang="en-US" dirty="0"/>
@@ -5985,7 +5932,7 @@
           <a:p>
             <a:pPr algn="ctr"/>
             <a:r>
-              <a:rPr lang="en-US" sz="1600" dirty="0" smtClean="0">
+              <a:rPr lang="en-US" sz="1600" dirty="0">
                 <a:solidFill>
                   <a:schemeClr val="bg1"/>
                 </a:solidFill>
@@ -6005,14 +5952,13 @@
           <p:cNvPr id="46" name="Straight Connector 45"/>
           <p:cNvCxnSpPr>
             <a:cxnSpLocks/>
-            <a:stCxn id="40" idx="2"/>
           </p:cNvCxnSpPr>
           <p:nvPr/>
         </p:nvCxnSpPr>
         <p:spPr>
           <a:xfrm>
-            <a:off x="9251907" y="1968381"/>
-            <a:ext cx="0" cy="4203819"/>
+            <a:off x="9250680" y="1968381"/>
+            <a:ext cx="0" cy="4501805"/>
           </a:xfrm>
           <a:prstGeom prst="line">
             <a:avLst/>
@@ -6048,7 +5994,7 @@
         </p:nvSpPr>
         <p:spPr>
           <a:xfrm>
-            <a:off x="9167459" y="4370843"/>
+            <a:off x="9167459" y="4522658"/>
             <a:ext cx="168896" cy="384920"/>
           </a:xfrm>
           <a:prstGeom prst="rect">
@@ -6133,7 +6079,7 @@
         </p:nvSpPr>
         <p:spPr>
           <a:xfrm>
-            <a:off x="3982763" y="6443990"/>
+            <a:off x="3982763" y="6703796"/>
             <a:ext cx="261610" cy="261610"/>
           </a:xfrm>
           <a:prstGeom prst="rect">
@@ -6263,7 +6209,7 @@
         </p:nvCxnSpPr>
         <p:spPr>
           <a:xfrm>
-            <a:off x="1763898" y="5440899"/>
+            <a:off x="1763898" y="5592714"/>
             <a:ext cx="4937362" cy="0"/>
           </a:xfrm>
           <a:prstGeom prst="straightConnector1">
@@ -6301,8 +6247,8 @@
         </p:nvSpPr>
         <p:spPr>
           <a:xfrm>
-            <a:off x="4039489" y="1995602"/>
-            <a:ext cx="154408" cy="4281070"/>
+            <a:off x="4039489" y="1995601"/>
+            <a:ext cx="154408" cy="4432881"/>
           </a:xfrm>
           <a:prstGeom prst="rect">
             <a:avLst/>
@@ -6418,10 +6364,9 @@
           </a:lstStyle>
           <a:p>
             <a:r>
-              <a:rPr lang="en-US" dirty="0" smtClean="0"/>
+              <a:rPr lang="en-US" dirty="0"/>
               <a:t>&lt;lambda&gt;.parse(tokenizer)</a:t>
             </a:r>
-            <a:endParaRPr lang="en-US" dirty="0"/>
           </a:p>
         </p:txBody>
       </p:sp>
@@ -6433,8 +6378,8 @@
         </p:nvSpPr>
         <p:spPr>
           <a:xfrm>
-            <a:off x="1615151" y="2881176"/>
-            <a:ext cx="154408" cy="2871978"/>
+            <a:off x="1615151" y="2881175"/>
+            <a:ext cx="154408" cy="3023793"/>
           </a:xfrm>
           <a:prstGeom prst="rect">
             <a:avLst/>
@@ -6514,53 +6459,52 @@
           <a:p>
             <a:pPr algn="ctr"/>
             <a:r>
-              <a:rPr lang="en-US" dirty="0" smtClean="0"/>
+              <a:rPr lang="en-US" dirty="0"/>
               <a:t>&lt;&lt;static&gt;&gt;</a:t>
             </a:r>
           </a:p>
           <a:p>
             <a:pPr algn="ctr"/>
             <a:r>
-              <a:rPr lang="en-US" dirty="0" err="1" smtClean="0"/>
+              <a:rPr lang="en-US" dirty="0" err="1"/>
               <a:t>makeFilter</a:t>
             </a:r>
             <a:r>
-              <a:rPr lang="en-US" dirty="0" smtClean="0"/>
+              <a:rPr lang="en-US" dirty="0"/>
               <a:t>(</a:t>
             </a:r>
             <a:r>
-              <a:rPr lang="en-US" dirty="0" err="1" smtClean="0"/>
+              <a:rPr lang="en-US" dirty="0" err="1"/>
               <a:t>clazz</a:t>
             </a:r>
             <a:r>
-              <a:rPr lang="en-US" dirty="0" smtClean="0"/>
+              <a:rPr lang="en-US" dirty="0"/>
               <a:t>, </a:t>
             </a:r>
             <a:r>
-              <a:rPr lang="en-US" dirty="0" err="1" smtClean="0"/>
+              <a:rPr lang="en-US" dirty="0" err="1"/>
               <a:t>setOp</a:t>
             </a:r>
             <a:r>
-              <a:rPr lang="en-US" dirty="0" smtClean="0"/>
+              <a:rPr lang="en-US" dirty="0"/>
               <a:t>, </a:t>
             </a:r>
             <a:r>
-              <a:rPr lang="en-US" dirty="0" err="1" smtClean="0"/>
+              <a:rPr lang="en-US" dirty="0" err="1"/>
               <a:t>filterOp</a:t>
             </a:r>
             <a:r>
-              <a:rPr lang="en-US" dirty="0" smtClean="0"/>
+              <a:rPr lang="en-US" dirty="0"/>
               <a:t>, </a:t>
             </a:r>
             <a:r>
-              <a:rPr lang="en-US" dirty="0" err="1" smtClean="0"/>
+              <a:rPr lang="en-US" dirty="0" err="1"/>
               <a:t>testPhrase</a:t>
             </a:r>
             <a:r>
-              <a:rPr lang="en-US" dirty="0" smtClean="0"/>
+              <a:rPr lang="en-US" dirty="0"/>
               <a:t>)</a:t>
             </a:r>
-            <a:endParaRPr lang="en-US" dirty="0"/>
           </a:p>
         </p:txBody>
       </p:sp>
@@ -6572,7 +6516,7 @@
         </p:nvSpPr>
         <p:spPr>
           <a:xfrm>
-            <a:off x="2375702" y="5537710"/>
+            <a:off x="2375702" y="5689525"/>
             <a:ext cx="990600" cy="215444"/>
           </a:xfrm>
           <a:prstGeom prst="rect">
@@ -6598,7 +6542,7 @@
           </a:lstStyle>
           <a:p>
             <a:r>
-              <a:rPr lang="en-US" dirty="0" err="1" smtClean="0"/>
+              <a:rPr lang="en-US" dirty="0" err="1"/>
               <a:t>setPredicate</a:t>
             </a:r>
             <a:endParaRPr lang="en-US" dirty="0"/>
@@ -6621,7 +6565,7 @@
         </p:nvCxnSpPr>
         <p:spPr>
           <a:xfrm>
-            <a:off x="1763898" y="5753154"/>
+            <a:off x="1763898" y="5904969"/>
             <a:ext cx="2275520" cy="0"/>
           </a:xfrm>
           <a:prstGeom prst="straightConnector1">
@@ -6660,7 +6604,7 @@
         </p:nvCxnSpPr>
         <p:spPr>
           <a:xfrm>
-            <a:off x="1691351" y="6279656"/>
+            <a:off x="1691351" y="6431471"/>
             <a:ext cx="2348067" cy="0"/>
           </a:xfrm>
           <a:prstGeom prst="straightConnector1">
@@ -6698,7 +6642,7 @@
         </p:nvSpPr>
         <p:spPr>
           <a:xfrm>
-            <a:off x="1991524" y="6061228"/>
+            <a:off x="1991524" y="6213043"/>
             <a:ext cx="1634150" cy="215444"/>
           </a:xfrm>
           <a:prstGeom prst="rect">
@@ -6724,7 +6668,7 @@
           </a:lstStyle>
           <a:p>
             <a:r>
-              <a:rPr lang="en-US" dirty="0" err="1" smtClean="0"/>
+              <a:rPr lang="en-US" dirty="0" err="1"/>
               <a:t>composedPredicate</a:t>
             </a:r>
             <a:endParaRPr lang="en-US" dirty="0"/>
@@ -6816,7 +6760,7 @@
           <a:p>
             <a:pPr algn="l"/>
             <a:r>
-              <a:rPr lang="en-US" dirty="0" smtClean="0">
+              <a:rPr lang="en-US" dirty="0">
                 <a:solidFill>
                   <a:schemeClr val="tx1"/>
                 </a:solidFill>
@@ -6824,7 +6768,7 @@
               <a:t>loop      </a:t>
             </a:r>
             <a:r>
-              <a:rPr lang="en-US" dirty="0" smtClean="0">
+              <a:rPr lang="en-US" dirty="0">
                 <a:solidFill>
                   <a:schemeClr val="tx1"/>
                 </a:solidFill>
@@ -6839,19 +6783,6 @@
               </a:rPr>
               <a:t>[until end of filter expression]</a:t>
             </a:r>
-            <a:endParaRPr lang="en-US" dirty="0">
-              <a:solidFill>
-                <a:schemeClr val="tx1"/>
-              </a:solidFill>
-              <a:effectLst>
-                <a:glow rad="127000">
-                  <a:schemeClr val="accent1">
-                    <a:lumMod val="20000"/>
-                    <a:lumOff val="80000"/>
-                  </a:schemeClr>
-                </a:glow>
-              </a:effectLst>
-            </a:endParaRPr>
           </a:p>
         </p:txBody>
       </p:sp>
@@ -6899,7 +6830,7 @@
           <a:p>
             <a:pPr algn="ctr"/>
             <a:r>
-              <a:rPr lang="en-US" sz="1600" dirty="0" err="1" smtClean="0">
+              <a:rPr lang="en-US" sz="1600" dirty="0" err="1">
                 <a:solidFill>
                   <a:schemeClr val="bg1"/>
                 </a:solidFill>
@@ -6926,7 +6857,7 @@
         <p:spPr>
           <a:xfrm>
             <a:off x="6787179" y="1968381"/>
-            <a:ext cx="0" cy="4203819"/>
+            <a:ext cx="0" cy="4501805"/>
           </a:xfrm>
           <a:prstGeom prst="line">
             <a:avLst/>
@@ -6963,7 +6894,7 @@
         <p:spPr>
           <a:xfrm>
             <a:off x="6701260" y="3191173"/>
-            <a:ext cx="168896" cy="2241601"/>
+            <a:ext cx="168896" cy="2401540"/>
           </a:xfrm>
           <a:prstGeom prst="rect">
             <a:avLst/>
@@ -7009,7 +6940,7 @@
         </p:nvSpPr>
         <p:spPr>
           <a:xfrm>
-            <a:off x="6792362" y="3415932"/>
+            <a:off x="6792362" y="3567747"/>
             <a:ext cx="154408" cy="1612962"/>
           </a:xfrm>
           <a:prstGeom prst="rect">
@@ -7063,7 +6994,7 @@
         </p:nvSpPr>
         <p:spPr>
           <a:xfrm>
-            <a:off x="6887903" y="3200477"/>
+            <a:off x="6887903" y="3352292"/>
             <a:ext cx="255113" cy="221457"/>
           </a:xfrm>
           <a:custGeom>
@@ -7214,7 +7145,7 @@
         </p:nvSpPr>
         <p:spPr>
           <a:xfrm flipV="1">
-            <a:off x="6894999" y="5037018"/>
+            <a:off x="6894999" y="5188833"/>
             <a:ext cx="255113" cy="221457"/>
           </a:xfrm>
           <a:custGeom>
@@ -7369,7 +7300,7 @@
         </p:nvCxnSpPr>
         <p:spPr>
           <a:xfrm>
-            <a:off x="6946770" y="4369647"/>
+            <a:off x="6946770" y="4521462"/>
             <a:ext cx="2197230" cy="0"/>
           </a:xfrm>
           <a:prstGeom prst="straightConnector1">
@@ -7405,7 +7336,7 @@
         </p:nvSpPr>
         <p:spPr>
           <a:xfrm flipV="1">
-            <a:off x="5916079" y="3595922"/>
+            <a:off x="5916079" y="3747737"/>
             <a:ext cx="632695" cy="323484"/>
           </a:xfrm>
           <a:prstGeom prst="snip1Rect">
@@ -7455,7 +7386,7 @@
         </p:nvSpPr>
         <p:spPr>
           <a:xfrm>
-            <a:off x="6068415" y="3651660"/>
+            <a:off x="6068415" y="3803475"/>
             <a:ext cx="2918192" cy="215444"/>
           </a:xfrm>
           <a:prstGeom prst="rect">
@@ -7482,7 +7413,7 @@
           <a:p>
             <a:pPr algn="l"/>
             <a:r>
-              <a:rPr lang="en-US" dirty="0" smtClean="0">
+              <a:rPr lang="en-US" dirty="0">
                 <a:solidFill>
                   <a:schemeClr val="tx1"/>
                 </a:solidFill>
@@ -7490,7 +7421,7 @@
               <a:t>loop      </a:t>
             </a:r>
             <a:r>
-              <a:rPr lang="en-US" dirty="0" smtClean="0">
+              <a:rPr lang="en-US" dirty="0">
                 <a:solidFill>
                   <a:schemeClr val="tx1"/>
                 </a:solidFill>
@@ -7505,19 +7436,6 @@
               </a:rPr>
               <a:t>[until end of test phrase]</a:t>
             </a:r>
-            <a:endParaRPr lang="en-US" dirty="0">
-              <a:solidFill>
-                <a:schemeClr val="tx1"/>
-              </a:solidFill>
-              <a:effectLst>
-                <a:glow rad="127000">
-                  <a:schemeClr val="accent4">
-                    <a:lumMod val="20000"/>
-                    <a:lumOff val="80000"/>
-                  </a:schemeClr>
-                </a:glow>
-              </a:effectLst>
-            </a:endParaRPr>
           </a:p>
         </p:txBody>
       </p:sp>
@@ -7529,7 +7447,7 @@
         </p:nvSpPr>
         <p:spPr>
           <a:xfrm>
-            <a:off x="7106672" y="2743785"/>
+            <a:off x="7106672" y="2895600"/>
             <a:ext cx="1673258" cy="646331"/>
           </a:xfrm>
           <a:prstGeom prst="rect">
@@ -7556,7 +7474,7 @@
           <a:p>
             <a:pPr algn="ctr"/>
             <a:r>
-              <a:rPr lang="en-US" dirty="0" smtClean="0">
+              <a:rPr lang="en-US" dirty="0">
                 <a:solidFill>
                   <a:srgbClr val="7030A0"/>
                 </a:solidFill>
@@ -7564,14 +7482,14 @@
               <a:t>&lt;&lt;static&gt;&gt;</a:t>
             </a:r>
             <a:br>
-              <a:rPr lang="en-US" dirty="0" smtClean="0">
+              <a:rPr lang="en-US" dirty="0">
                 <a:solidFill>
                   <a:srgbClr val="7030A0"/>
                 </a:solidFill>
               </a:rPr>
             </a:br>
             <a:r>
-              <a:rPr lang="en-US" dirty="0" err="1" smtClean="0">
+              <a:rPr lang="en-US" dirty="0" err="1">
                 <a:solidFill>
                   <a:srgbClr val="7030A0"/>
                 </a:solidFill>
@@ -7579,7 +7497,7 @@
               <a:t>parseTestPhrase</a:t>
             </a:r>
             <a:r>
-              <a:rPr lang="en-US" dirty="0" smtClean="0">
+              <a:rPr lang="en-US" dirty="0">
                 <a:solidFill>
                   <a:srgbClr val="7030A0"/>
                 </a:solidFill>
@@ -7587,7 +7505,7 @@
               <a:t>(</a:t>
             </a:r>
             <a:r>
-              <a:rPr lang="en-US" dirty="0" err="1" smtClean="0">
+              <a:rPr lang="en-US" dirty="0" err="1">
                 <a:solidFill>
                   <a:srgbClr val="7030A0"/>
                 </a:solidFill>
@@ -7595,7 +7513,7 @@
               <a:t>clazz</a:t>
             </a:r>
             <a:r>
-              <a:rPr lang="en-US" dirty="0" smtClean="0">
+              <a:rPr lang="en-US" dirty="0">
                 <a:solidFill>
                   <a:srgbClr val="7030A0"/>
                 </a:solidFill>
@@ -7603,7 +7521,7 @@
               <a:t>, </a:t>
             </a:r>
             <a:r>
-              <a:rPr lang="en-US" dirty="0" err="1" smtClean="0">
+              <a:rPr lang="en-US" dirty="0" err="1">
                 <a:solidFill>
                   <a:srgbClr val="7030A0"/>
                 </a:solidFill>
@@ -7611,7 +7529,7 @@
               <a:t>filterOp</a:t>
             </a:r>
             <a:r>
-              <a:rPr lang="en-US" dirty="0" smtClean="0">
+              <a:rPr lang="en-US" dirty="0">
                 <a:solidFill>
                   <a:srgbClr val="7030A0"/>
                 </a:solidFill>
@@ -7619,7 +7537,7 @@
               <a:t>, </a:t>
             </a:r>
             <a:r>
-              <a:rPr lang="en-US" dirty="0" err="1" smtClean="0">
+              <a:rPr lang="en-US" dirty="0" err="1">
                 <a:solidFill>
                   <a:srgbClr val="7030A0"/>
                 </a:solidFill>
@@ -7627,18 +7545,13 @@
               <a:t>testPhrase</a:t>
             </a:r>
             <a:r>
-              <a:rPr lang="en-US" dirty="0" smtClean="0">
+              <a:rPr lang="en-US" dirty="0">
                 <a:solidFill>
                   <a:srgbClr val="7030A0"/>
                 </a:solidFill>
               </a:rPr>
               <a:t>)</a:t>
             </a:r>
-            <a:endParaRPr lang="en-US" dirty="0">
-              <a:solidFill>
-                <a:srgbClr val="7030A0"/>
-              </a:solidFill>
-            </a:endParaRPr>
           </a:p>
         </p:txBody>
       </p:sp>
@@ -7650,7 +7563,7 @@
         </p:nvSpPr>
         <p:spPr>
           <a:xfrm>
-            <a:off x="7049542" y="3938760"/>
+            <a:off x="7049542" y="4090575"/>
             <a:ext cx="1979133" cy="430887"/>
           </a:xfrm>
           <a:prstGeom prst="rect">
@@ -7677,7 +7590,7 @@
           <a:p>
             <a:pPr algn="ctr"/>
             <a:r>
-              <a:rPr lang="en-US" dirty="0" smtClean="0">
+              <a:rPr lang="en-US" dirty="0">
                 <a:solidFill>
                   <a:srgbClr val="7030A0"/>
                 </a:solidFill>
@@ -7688,7 +7601,7 @@
           <a:p>
             <a:pPr algn="ctr"/>
             <a:r>
-              <a:rPr lang="en-US" dirty="0" err="1" smtClean="0">
+              <a:rPr lang="en-US" dirty="0" err="1">
                 <a:solidFill>
                   <a:srgbClr val="7030A0"/>
                 </a:solidFill>
@@ -7696,7 +7609,7 @@
               <a:t>makeFilter</a:t>
             </a:r>
             <a:r>
-              <a:rPr lang="en-US" dirty="0" smtClean="0">
+              <a:rPr lang="en-US" dirty="0">
                 <a:solidFill>
                   <a:srgbClr val="7030A0"/>
                 </a:solidFill>
@@ -7704,7 +7617,7 @@
               <a:t>(</a:t>
             </a:r>
             <a:r>
-              <a:rPr lang="en-US" dirty="0" err="1" smtClean="0">
+              <a:rPr lang="en-US" dirty="0" err="1">
                 <a:solidFill>
                   <a:srgbClr val="7030A0"/>
                 </a:solidFill>
@@ -7712,18 +7625,13 @@
               <a:t>filterOp</a:t>
             </a:r>
             <a:r>
-              <a:rPr lang="en-US" dirty="0" smtClean="0">
+              <a:rPr lang="en-US" dirty="0">
                 <a:solidFill>
                   <a:srgbClr val="7030A0"/>
                 </a:solidFill>
               </a:rPr>
               <a:t>, token)</a:t>
             </a:r>
-            <a:endParaRPr lang="en-US" dirty="0">
-              <a:solidFill>
-                <a:srgbClr val="7030A0"/>
-              </a:solidFill>
-            </a:endParaRPr>
           </a:p>
         </p:txBody>
       </p:sp>
@@ -7743,7 +7651,7 @@
         </p:nvCxnSpPr>
         <p:spPr>
           <a:xfrm>
-            <a:off x="6946770" y="4760262"/>
+            <a:off x="6946770" y="4912077"/>
             <a:ext cx="2194925" cy="0"/>
           </a:xfrm>
           <a:prstGeom prst="straightConnector1">
@@ -7781,7 +7689,7 @@
         </p:nvSpPr>
         <p:spPr>
           <a:xfrm>
-            <a:off x="7697147" y="4526128"/>
+            <a:off x="7697147" y="4677943"/>
             <a:ext cx="738788" cy="215444"/>
           </a:xfrm>
           <a:prstGeom prst="rect">
@@ -7807,18 +7715,13 @@
           </a:lstStyle>
           <a:p>
             <a:r>
-              <a:rPr lang="en-US" dirty="0" smtClean="0">
+              <a:rPr lang="en-US" dirty="0">
                 <a:solidFill>
                   <a:srgbClr val="7030A0"/>
                 </a:solidFill>
               </a:rPr>
               <a:t>predicate</a:t>
             </a:r>
-            <a:endParaRPr lang="en-US" dirty="0">
-              <a:solidFill>
-                <a:srgbClr val="7030A0"/>
-              </a:solidFill>
-            </a:endParaRPr>
           </a:p>
         </p:txBody>
       </p:sp>

</xml_diff>